<commit_message>
Add more concepts abilities.
</commit_message>
<xml_diff>
--- a/The Compilation Power – C++.pptx
+++ b/The Compilation Power – C++.pptx
@@ -6,10 +6,10 @@
     <p:sldMasterId id="2147483696" r:id="rId2"/>
   </p:sldMasterIdLst>
   <p:notesMasterIdLst>
-    <p:notesMasterId r:id="rId11"/>
+    <p:notesMasterId r:id="rId13"/>
   </p:notesMasterIdLst>
   <p:handoutMasterIdLst>
-    <p:handoutMasterId r:id="rId12"/>
+    <p:handoutMasterId r:id="rId14"/>
   </p:handoutMasterIdLst>
   <p:sldIdLst>
     <p:sldId id="256" r:id="rId3"/>
@@ -19,7 +19,9 @@
     <p:sldId id="261" r:id="rId7"/>
     <p:sldId id="262" r:id="rId8"/>
     <p:sldId id="263" r:id="rId9"/>
-    <p:sldId id="259" r:id="rId10"/>
+    <p:sldId id="264" r:id="rId10"/>
+    <p:sldId id="265" r:id="rId11"/>
+    <p:sldId id="259" r:id="rId12"/>
   </p:sldIdLst>
   <p:sldSz cx="12192000" cy="6858000"/>
   <p:notesSz cx="6858000" cy="9144000"/>
@@ -130,6 +132,8 @@
             <p14:sldId id="261"/>
             <p14:sldId id="262"/>
             <p14:sldId id="263"/>
+            <p14:sldId id="264"/>
+            <p14:sldId id="265"/>
             <p14:sldId id="259"/>
           </p14:sldIdLst>
         </p14:section>
@@ -18946,6 +18950,886 @@
 </p:sld>
 </file>
 
+<file path=ppt/slides/slide10.xml><?xml version="1.0" encoding="utf-8"?>
+<p:sld xmlns:a="http://schemas.openxmlformats.org/drawingml/2006/main" xmlns:r="http://schemas.openxmlformats.org/officeDocument/2006/relationships" xmlns:p="http://schemas.openxmlformats.org/presentationml/2006/main">
+  <p:cSld>
+    <p:spTree>
+      <p:nvGrpSpPr>
+        <p:cNvPr id="1" name=""/>
+        <p:cNvGrpSpPr/>
+        <p:nvPr/>
+      </p:nvGrpSpPr>
+      <p:grpSpPr>
+        <a:xfrm>
+          <a:off x="0" y="0"/>
+          <a:ext cx="0" cy="0"/>
+          <a:chOff x="0" y="0"/>
+          <a:chExt cx="0" cy="0"/>
+        </a:xfrm>
+      </p:grpSpPr>
+      <p:sp>
+        <p:nvSpPr>
+          <p:cNvPr id="2" name="Title 1"/>
+          <p:cNvSpPr>
+            <a:spLocks noGrp="1"/>
+          </p:cNvSpPr>
+          <p:nvPr>
+            <p:ph type="title"/>
+          </p:nvPr>
+        </p:nvSpPr>
+        <p:spPr/>
+        <p:txBody>
+          <a:bodyPr/>
+          <a:lstStyle/>
+          <a:p>
+            <a:r>
+              <a:rPr lang="en-US" dirty="0"/>
+              <a:t>Questions</a:t>
+            </a:r>
+            <a:endParaRPr lang="he-IL" dirty="0"/>
+          </a:p>
+        </p:txBody>
+      </p:sp>
+      <p:sp>
+        <p:nvSpPr>
+          <p:cNvPr id="3" name="Content Placeholder 2"/>
+          <p:cNvSpPr>
+            <a:spLocks noGrp="1"/>
+          </p:cNvSpPr>
+          <p:nvPr>
+            <p:ph idx="1"/>
+          </p:nvPr>
+        </p:nvSpPr>
+        <p:spPr>
+          <a:xfrm>
+            <a:off x="1141412" y="2249487"/>
+            <a:ext cx="9905999" cy="560825"/>
+          </a:xfrm>
+        </p:spPr>
+        <p:txBody>
+          <a:bodyPr/>
+          <a:lstStyle/>
+          <a:p>
+            <a:pPr marL="0" indent="0" algn="l" rtl="0">
+              <a:buNone/>
+            </a:pPr>
+            <a:r>
+              <a:rPr lang="en-US" dirty="0"/>
+              <a:t>If you have any questions, speak now or for ever hold your peace.</a:t>
+            </a:r>
+          </a:p>
+        </p:txBody>
+      </p:sp>
+      <p:sp>
+        <p:nvSpPr>
+          <p:cNvPr id="4" name="TextBox 3"/>
+          <p:cNvSpPr txBox="1"/>
+          <p:nvPr/>
+        </p:nvSpPr>
+        <p:spPr>
+          <a:xfrm>
+            <a:off x="1141412" y="2810312"/>
+            <a:ext cx="2954207" cy="369332"/>
+          </a:xfrm>
+          <a:prstGeom prst="rect">
+            <a:avLst/>
+          </a:prstGeom>
+          <a:noFill/>
+        </p:spPr>
+        <p:txBody>
+          <a:bodyPr wrap="none" rtlCol="1">
+            <a:spAutoFit/>
+          </a:bodyPr>
+          <a:lstStyle/>
+          <a:p>
+            <a:r>
+              <a:rPr lang="en-US" dirty="0"/>
+              <a:t>Or at least until you’ll be near</a:t>
+            </a:r>
+            <a:endParaRPr lang="he-IL" dirty="0"/>
+          </a:p>
+        </p:txBody>
+      </p:sp>
+      <p:sp>
+        <p:nvSpPr>
+          <p:cNvPr id="5" name="TextBox 4"/>
+          <p:cNvSpPr txBox="1"/>
+          <p:nvPr/>
+        </p:nvSpPr>
+        <p:spPr>
+          <a:xfrm>
+            <a:off x="1283516" y="3632433"/>
+            <a:ext cx="2147254" cy="369332"/>
+          </a:xfrm>
+          <a:prstGeom prst="rect">
+            <a:avLst/>
+          </a:prstGeom>
+          <a:noFill/>
+        </p:spPr>
+        <p:txBody>
+          <a:bodyPr wrap="none" rtlCol="1">
+            <a:spAutoFit/>
+          </a:bodyPr>
+          <a:lstStyle/>
+          <a:p>
+            <a:r>
+              <a:rPr lang="en-US" dirty="0"/>
+              <a:t>LinkedIn: /</a:t>
+            </a:r>
+            <a:r>
+              <a:rPr lang="en-US" dirty="0" err="1"/>
+              <a:t>koralkashri</a:t>
+            </a:r>
+            <a:endParaRPr lang="he-IL" dirty="0"/>
+          </a:p>
+        </p:txBody>
+      </p:sp>
+      <p:sp>
+        <p:nvSpPr>
+          <p:cNvPr id="6" name="TextBox 5"/>
+          <p:cNvSpPr txBox="1"/>
+          <p:nvPr/>
+        </p:nvSpPr>
+        <p:spPr>
+          <a:xfrm>
+            <a:off x="6459523" y="3632433"/>
+            <a:ext cx="2860398" cy="369332"/>
+          </a:xfrm>
+          <a:prstGeom prst="rect">
+            <a:avLst/>
+          </a:prstGeom>
+          <a:noFill/>
+        </p:spPr>
+        <p:txBody>
+          <a:bodyPr wrap="none" rtlCol="1">
+            <a:spAutoFit/>
+          </a:bodyPr>
+          <a:lstStyle/>
+          <a:p>
+            <a:r>
+              <a:rPr lang="en-US" dirty="0"/>
+              <a:t>Mail: koralkashri@gmail.com</a:t>
+            </a:r>
+            <a:endParaRPr lang="he-IL" dirty="0"/>
+          </a:p>
+        </p:txBody>
+      </p:sp>
+      <p:sp>
+        <p:nvSpPr>
+          <p:cNvPr id="7" name="TextBox 6"/>
+          <p:cNvSpPr txBox="1"/>
+          <p:nvPr/>
+        </p:nvSpPr>
+        <p:spPr>
+          <a:xfrm>
+            <a:off x="1283516" y="4001765"/>
+            <a:ext cx="2074927" cy="369332"/>
+          </a:xfrm>
+          <a:prstGeom prst="rect">
+            <a:avLst/>
+          </a:prstGeom>
+          <a:noFill/>
+        </p:spPr>
+        <p:txBody>
+          <a:bodyPr wrap="none" rtlCol="1">
+            <a:spAutoFit/>
+          </a:bodyPr>
+          <a:lstStyle/>
+          <a:p>
+            <a:r>
+              <a:rPr lang="en-US" dirty="0"/>
+              <a:t>GitHub: /</a:t>
+            </a:r>
+            <a:r>
+              <a:rPr lang="en-US" dirty="0" err="1"/>
+              <a:t>koralkashri</a:t>
+            </a:r>
+            <a:endParaRPr lang="he-IL" dirty="0"/>
+          </a:p>
+        </p:txBody>
+      </p:sp>
+      <p:sp>
+        <p:nvSpPr>
+          <p:cNvPr id="9" name="TextBox 8"/>
+          <p:cNvSpPr txBox="1"/>
+          <p:nvPr/>
+        </p:nvSpPr>
+        <p:spPr>
+          <a:xfrm>
+            <a:off x="6459523" y="4001765"/>
+            <a:ext cx="2146806" cy="369332"/>
+          </a:xfrm>
+          <a:prstGeom prst="rect">
+            <a:avLst/>
+          </a:prstGeom>
+          <a:noFill/>
+        </p:spPr>
+        <p:txBody>
+          <a:bodyPr wrap="none" rtlCol="1">
+            <a:spAutoFit/>
+          </a:bodyPr>
+          <a:lstStyle/>
+          <a:p>
+            <a:r>
+              <a:rPr lang="en-US" dirty="0"/>
+              <a:t>Twitter: @</a:t>
+            </a:r>
+            <a:r>
+              <a:rPr lang="en-US" dirty="0" err="1"/>
+              <a:t>koralkashri</a:t>
+            </a:r>
+            <a:endParaRPr lang="he-IL" dirty="0"/>
+          </a:p>
+        </p:txBody>
+      </p:sp>
+    </p:spTree>
+    <p:extLst>
+      <p:ext uri="{BB962C8B-B14F-4D97-AF65-F5344CB8AC3E}">
+        <p14:creationId xmlns:p14="http://schemas.microsoft.com/office/powerpoint/2010/main" val="1977489723"/>
+      </p:ext>
+    </p:extLst>
+  </p:cSld>
+  <p:clrMapOvr>
+    <a:masterClrMapping/>
+  </p:clrMapOvr>
+  <p:timing>
+    <p:tnLst>
+      <p:par>
+        <p:cTn id="1" dur="indefinite" restart="never" nodeType="tmRoot">
+          <p:childTnLst>
+            <p:seq concurrent="1" nextAc="seek">
+              <p:cTn id="2" dur="indefinite" nodeType="mainSeq">
+                <p:childTnLst>
+                  <p:par>
+                    <p:cTn id="3" fill="hold">
+                      <p:stCondLst>
+                        <p:cond delay="indefinite"/>
+                      </p:stCondLst>
+                      <p:childTnLst>
+                        <p:par>
+                          <p:cTn id="4" fill="hold">
+                            <p:stCondLst>
+                              <p:cond delay="0"/>
+                            </p:stCondLst>
+                            <p:childTnLst>
+                              <p:par>
+                                <p:cTn id="5" presetID="42" presetClass="entr" presetSubtype="0" fill="hold" grpId="0" nodeType="clickEffect">
+                                  <p:stCondLst>
+                                    <p:cond delay="0"/>
+                                  </p:stCondLst>
+                                  <p:childTnLst>
+                                    <p:set>
+                                      <p:cBhvr>
+                                        <p:cTn id="6" dur="1" fill="hold">
+                                          <p:stCondLst>
+                                            <p:cond delay="0"/>
+                                          </p:stCondLst>
+                                        </p:cTn>
+                                        <p:tgtEl>
+                                          <p:spTgt spid="3">
+                                            <p:txEl>
+                                              <p:pRg st="0" end="0"/>
+                                            </p:txEl>
+                                          </p:spTgt>
+                                        </p:tgtEl>
+                                        <p:attrNameLst>
+                                          <p:attrName>style.visibility</p:attrName>
+                                        </p:attrNameLst>
+                                      </p:cBhvr>
+                                      <p:to>
+                                        <p:strVal val="visible"/>
+                                      </p:to>
+                                    </p:set>
+                                    <p:animEffect transition="in" filter="fade">
+                                      <p:cBhvr>
+                                        <p:cTn id="7" dur="1000"/>
+                                        <p:tgtEl>
+                                          <p:spTgt spid="3">
+                                            <p:txEl>
+                                              <p:pRg st="0" end="0"/>
+                                            </p:txEl>
+                                          </p:spTgt>
+                                        </p:tgtEl>
+                                      </p:cBhvr>
+                                    </p:animEffect>
+                                    <p:anim calcmode="lin" valueType="num">
+                                      <p:cBhvr>
+                                        <p:cTn id="8" dur="1000" fill="hold"/>
+                                        <p:tgtEl>
+                                          <p:spTgt spid="3">
+                                            <p:txEl>
+                                              <p:pRg st="0" end="0"/>
+                                            </p:txEl>
+                                          </p:spTgt>
+                                        </p:tgtEl>
+                                        <p:attrNameLst>
+                                          <p:attrName>ppt_x</p:attrName>
+                                        </p:attrNameLst>
+                                      </p:cBhvr>
+                                      <p:tavLst>
+                                        <p:tav tm="0">
+                                          <p:val>
+                                            <p:strVal val="#ppt_x"/>
+                                          </p:val>
+                                        </p:tav>
+                                        <p:tav tm="100000">
+                                          <p:val>
+                                            <p:strVal val="#ppt_x"/>
+                                          </p:val>
+                                        </p:tav>
+                                      </p:tavLst>
+                                    </p:anim>
+                                    <p:anim calcmode="lin" valueType="num">
+                                      <p:cBhvr>
+                                        <p:cTn id="9" dur="1000" fill="hold"/>
+                                        <p:tgtEl>
+                                          <p:spTgt spid="3">
+                                            <p:txEl>
+                                              <p:pRg st="0" end="0"/>
+                                            </p:txEl>
+                                          </p:spTgt>
+                                        </p:tgtEl>
+                                        <p:attrNameLst>
+                                          <p:attrName>ppt_y</p:attrName>
+                                        </p:attrNameLst>
+                                      </p:cBhvr>
+                                      <p:tavLst>
+                                        <p:tav tm="0">
+                                          <p:val>
+                                            <p:strVal val="#ppt_y+.1"/>
+                                          </p:val>
+                                        </p:tav>
+                                        <p:tav tm="100000">
+                                          <p:val>
+                                            <p:strVal val="#ppt_y"/>
+                                          </p:val>
+                                        </p:tav>
+                                      </p:tavLst>
+                                    </p:anim>
+                                  </p:childTnLst>
+                                </p:cTn>
+                              </p:par>
+                            </p:childTnLst>
+                          </p:cTn>
+                        </p:par>
+                        <p:par>
+                          <p:cTn id="10" fill="hold">
+                            <p:stCondLst>
+                              <p:cond delay="1000"/>
+                            </p:stCondLst>
+                            <p:childTnLst>
+                              <p:par>
+                                <p:cTn id="11" presetID="16" presetClass="entr" presetSubtype="21" fill="hold" grpId="0" nodeType="afterEffect">
+                                  <p:stCondLst>
+                                    <p:cond delay="500"/>
+                                  </p:stCondLst>
+                                  <p:childTnLst>
+                                    <p:set>
+                                      <p:cBhvr>
+                                        <p:cTn id="12" dur="1" fill="hold">
+                                          <p:stCondLst>
+                                            <p:cond delay="0"/>
+                                          </p:stCondLst>
+                                        </p:cTn>
+                                        <p:tgtEl>
+                                          <p:spTgt spid="4"/>
+                                        </p:tgtEl>
+                                        <p:attrNameLst>
+                                          <p:attrName>style.visibility</p:attrName>
+                                        </p:attrNameLst>
+                                      </p:cBhvr>
+                                      <p:to>
+                                        <p:strVal val="visible"/>
+                                      </p:to>
+                                    </p:set>
+                                    <p:animEffect transition="in" filter="barn(inVertical)">
+                                      <p:cBhvr>
+                                        <p:cTn id="13" dur="500"/>
+                                        <p:tgtEl>
+                                          <p:spTgt spid="4"/>
+                                        </p:tgtEl>
+                                      </p:cBhvr>
+                                    </p:animEffect>
+                                  </p:childTnLst>
+                                </p:cTn>
+                              </p:par>
+                            </p:childTnLst>
+                          </p:cTn>
+                        </p:par>
+                        <p:par>
+                          <p:cTn id="14" fill="hold">
+                            <p:stCondLst>
+                              <p:cond delay="2000"/>
+                            </p:stCondLst>
+                            <p:childTnLst>
+                              <p:par>
+                                <p:cTn id="15" presetID="14" presetClass="entr" presetSubtype="10" fill="hold" grpId="0" nodeType="afterEffect">
+                                  <p:stCondLst>
+                                    <p:cond delay="500"/>
+                                  </p:stCondLst>
+                                  <p:childTnLst>
+                                    <p:set>
+                                      <p:cBhvr>
+                                        <p:cTn id="16" dur="1" fill="hold">
+                                          <p:stCondLst>
+                                            <p:cond delay="0"/>
+                                          </p:stCondLst>
+                                        </p:cTn>
+                                        <p:tgtEl>
+                                          <p:spTgt spid="5"/>
+                                        </p:tgtEl>
+                                        <p:attrNameLst>
+                                          <p:attrName>style.visibility</p:attrName>
+                                        </p:attrNameLst>
+                                      </p:cBhvr>
+                                      <p:to>
+                                        <p:strVal val="visible"/>
+                                      </p:to>
+                                    </p:set>
+                                    <p:animEffect transition="in" filter="randombar(horizontal)">
+                                      <p:cBhvr>
+                                        <p:cTn id="17" dur="500"/>
+                                        <p:tgtEl>
+                                          <p:spTgt spid="5"/>
+                                        </p:tgtEl>
+                                      </p:cBhvr>
+                                    </p:animEffect>
+                                  </p:childTnLst>
+                                </p:cTn>
+                              </p:par>
+                              <p:par>
+                                <p:cTn id="18" presetID="6" presetClass="entr" presetSubtype="16" fill="hold" grpId="0" nodeType="withEffect">
+                                  <p:stCondLst>
+                                    <p:cond delay="500"/>
+                                  </p:stCondLst>
+                                  <p:childTnLst>
+                                    <p:set>
+                                      <p:cBhvr>
+                                        <p:cTn id="19" dur="1" fill="hold">
+                                          <p:stCondLst>
+                                            <p:cond delay="0"/>
+                                          </p:stCondLst>
+                                        </p:cTn>
+                                        <p:tgtEl>
+                                          <p:spTgt spid="7"/>
+                                        </p:tgtEl>
+                                        <p:attrNameLst>
+                                          <p:attrName>style.visibility</p:attrName>
+                                        </p:attrNameLst>
+                                      </p:cBhvr>
+                                      <p:to>
+                                        <p:strVal val="visible"/>
+                                      </p:to>
+                                    </p:set>
+                                    <p:animEffect transition="in" filter="circle(in)">
+                                      <p:cBhvr>
+                                        <p:cTn id="20" dur="2000"/>
+                                        <p:tgtEl>
+                                          <p:spTgt spid="7"/>
+                                        </p:tgtEl>
+                                      </p:cBhvr>
+                                    </p:animEffect>
+                                  </p:childTnLst>
+                                </p:cTn>
+                              </p:par>
+                              <p:par>
+                                <p:cTn id="21" presetID="45" presetClass="entr" presetSubtype="0" fill="hold" grpId="0" nodeType="withEffect">
+                                  <p:stCondLst>
+                                    <p:cond delay="500"/>
+                                  </p:stCondLst>
+                                  <p:childTnLst>
+                                    <p:set>
+                                      <p:cBhvr>
+                                        <p:cTn id="22" dur="1" fill="hold">
+                                          <p:stCondLst>
+                                            <p:cond delay="0"/>
+                                          </p:stCondLst>
+                                        </p:cTn>
+                                        <p:tgtEl>
+                                          <p:spTgt spid="6"/>
+                                        </p:tgtEl>
+                                        <p:attrNameLst>
+                                          <p:attrName>style.visibility</p:attrName>
+                                        </p:attrNameLst>
+                                      </p:cBhvr>
+                                      <p:to>
+                                        <p:strVal val="visible"/>
+                                      </p:to>
+                                    </p:set>
+                                    <p:animEffect transition="in" filter="fade">
+                                      <p:cBhvr>
+                                        <p:cTn id="23" dur="2000"/>
+                                        <p:tgtEl>
+                                          <p:spTgt spid="6"/>
+                                        </p:tgtEl>
+                                      </p:cBhvr>
+                                    </p:animEffect>
+                                    <p:anim calcmode="lin" valueType="num">
+                                      <p:cBhvr>
+                                        <p:cTn id="24" dur="2000" fill="hold"/>
+                                        <p:tgtEl>
+                                          <p:spTgt spid="6"/>
+                                        </p:tgtEl>
+                                        <p:attrNameLst>
+                                          <p:attrName>ppt_w</p:attrName>
+                                        </p:attrNameLst>
+                                      </p:cBhvr>
+                                      <p:tavLst>
+                                        <p:tav tm="0" fmla="#ppt_w*sin(2.5*pi*$)">
+                                          <p:val>
+                                            <p:fltVal val="0"/>
+                                          </p:val>
+                                        </p:tav>
+                                        <p:tav tm="100000">
+                                          <p:val>
+                                            <p:fltVal val="1"/>
+                                          </p:val>
+                                        </p:tav>
+                                      </p:tavLst>
+                                    </p:anim>
+                                    <p:anim calcmode="lin" valueType="num">
+                                      <p:cBhvr>
+                                        <p:cTn id="25" dur="2000" fill="hold"/>
+                                        <p:tgtEl>
+                                          <p:spTgt spid="6"/>
+                                        </p:tgtEl>
+                                        <p:attrNameLst>
+                                          <p:attrName>ppt_h</p:attrName>
+                                        </p:attrNameLst>
+                                      </p:cBhvr>
+                                      <p:tavLst>
+                                        <p:tav tm="0">
+                                          <p:val>
+                                            <p:strVal val="#ppt_h"/>
+                                          </p:val>
+                                        </p:tav>
+                                        <p:tav tm="100000">
+                                          <p:val>
+                                            <p:strVal val="#ppt_h"/>
+                                          </p:val>
+                                        </p:tav>
+                                      </p:tavLst>
+                                    </p:anim>
+                                  </p:childTnLst>
+                                </p:cTn>
+                              </p:par>
+                              <p:par>
+                                <p:cTn id="26" presetID="26" presetClass="entr" presetSubtype="0" fill="hold" grpId="0" nodeType="withEffect">
+                                  <p:stCondLst>
+                                    <p:cond delay="500"/>
+                                  </p:stCondLst>
+                                  <p:childTnLst>
+                                    <p:set>
+                                      <p:cBhvr>
+                                        <p:cTn id="27" dur="1" fill="hold">
+                                          <p:stCondLst>
+                                            <p:cond delay="0"/>
+                                          </p:stCondLst>
+                                        </p:cTn>
+                                        <p:tgtEl>
+                                          <p:spTgt spid="9"/>
+                                        </p:tgtEl>
+                                        <p:attrNameLst>
+                                          <p:attrName>style.visibility</p:attrName>
+                                        </p:attrNameLst>
+                                      </p:cBhvr>
+                                      <p:to>
+                                        <p:strVal val="visible"/>
+                                      </p:to>
+                                    </p:set>
+                                    <p:animEffect transition="in" filter="wipe(down)">
+                                      <p:cBhvr>
+                                        <p:cTn id="28" dur="580">
+                                          <p:stCondLst>
+                                            <p:cond delay="0"/>
+                                          </p:stCondLst>
+                                        </p:cTn>
+                                        <p:tgtEl>
+                                          <p:spTgt spid="9"/>
+                                        </p:tgtEl>
+                                      </p:cBhvr>
+                                    </p:animEffect>
+                                    <p:anim calcmode="lin" valueType="num">
+                                      <p:cBhvr>
+                                        <p:cTn id="29" dur="1822" tmFilter="0,0; 0.14,0.36; 0.43,0.73; 0.71,0.91; 1.0,1.0">
+                                          <p:stCondLst>
+                                            <p:cond delay="0"/>
+                                          </p:stCondLst>
+                                        </p:cTn>
+                                        <p:tgtEl>
+                                          <p:spTgt spid="9"/>
+                                        </p:tgtEl>
+                                        <p:attrNameLst>
+                                          <p:attrName>ppt_x</p:attrName>
+                                        </p:attrNameLst>
+                                      </p:cBhvr>
+                                      <p:tavLst>
+                                        <p:tav tm="0">
+                                          <p:val>
+                                            <p:strVal val="#ppt_x-0.25"/>
+                                          </p:val>
+                                        </p:tav>
+                                        <p:tav tm="100000">
+                                          <p:val>
+                                            <p:strVal val="#ppt_x"/>
+                                          </p:val>
+                                        </p:tav>
+                                      </p:tavLst>
+                                    </p:anim>
+                                    <p:anim calcmode="lin" valueType="num">
+                                      <p:cBhvr>
+                                        <p:cTn id="30" dur="664" tmFilter="0.0,0.0; 0.25,0.07; 0.50,0.2; 0.75,0.467; 1.0,1.0">
+                                          <p:stCondLst>
+                                            <p:cond delay="0"/>
+                                          </p:stCondLst>
+                                        </p:cTn>
+                                        <p:tgtEl>
+                                          <p:spTgt spid="9"/>
+                                        </p:tgtEl>
+                                        <p:attrNameLst>
+                                          <p:attrName>ppt_y</p:attrName>
+                                        </p:attrNameLst>
+                                      </p:cBhvr>
+                                      <p:tavLst>
+                                        <p:tav tm="0" fmla="#ppt_y-sin(pi*$)/3">
+                                          <p:val>
+                                            <p:fltVal val="0.5"/>
+                                          </p:val>
+                                        </p:tav>
+                                        <p:tav tm="100000">
+                                          <p:val>
+                                            <p:fltVal val="1"/>
+                                          </p:val>
+                                        </p:tav>
+                                      </p:tavLst>
+                                    </p:anim>
+                                    <p:anim calcmode="lin" valueType="num">
+                                      <p:cBhvr>
+                                        <p:cTn id="31" dur="664" tmFilter="0, 0; 0.125,0.2665; 0.25,0.4; 0.375,0.465; 0.5,0.5;  0.625,0.535; 0.75,0.6; 0.875,0.7335; 1,1">
+                                          <p:stCondLst>
+                                            <p:cond delay="664"/>
+                                          </p:stCondLst>
+                                        </p:cTn>
+                                        <p:tgtEl>
+                                          <p:spTgt spid="9"/>
+                                        </p:tgtEl>
+                                        <p:attrNameLst>
+                                          <p:attrName>ppt_y</p:attrName>
+                                        </p:attrNameLst>
+                                      </p:cBhvr>
+                                      <p:tavLst>
+                                        <p:tav tm="0" fmla="#ppt_y-sin(pi*$)/9">
+                                          <p:val>
+                                            <p:fltVal val="0"/>
+                                          </p:val>
+                                        </p:tav>
+                                        <p:tav tm="100000">
+                                          <p:val>
+                                            <p:fltVal val="1"/>
+                                          </p:val>
+                                        </p:tav>
+                                      </p:tavLst>
+                                    </p:anim>
+                                    <p:anim calcmode="lin" valueType="num">
+                                      <p:cBhvr>
+                                        <p:cTn id="32" dur="332" tmFilter="0, 0; 0.125,0.2665; 0.25,0.4; 0.375,0.465; 0.5,0.5;  0.625,0.535; 0.75,0.6; 0.875,0.7335; 1,1">
+                                          <p:stCondLst>
+                                            <p:cond delay="1324"/>
+                                          </p:stCondLst>
+                                        </p:cTn>
+                                        <p:tgtEl>
+                                          <p:spTgt spid="9"/>
+                                        </p:tgtEl>
+                                        <p:attrNameLst>
+                                          <p:attrName>ppt_y</p:attrName>
+                                        </p:attrNameLst>
+                                      </p:cBhvr>
+                                      <p:tavLst>
+                                        <p:tav tm="0" fmla="#ppt_y-sin(pi*$)/27">
+                                          <p:val>
+                                            <p:fltVal val="0"/>
+                                          </p:val>
+                                        </p:tav>
+                                        <p:tav tm="100000">
+                                          <p:val>
+                                            <p:fltVal val="1"/>
+                                          </p:val>
+                                        </p:tav>
+                                      </p:tavLst>
+                                    </p:anim>
+                                    <p:anim calcmode="lin" valueType="num">
+                                      <p:cBhvr>
+                                        <p:cTn id="33" dur="164" tmFilter="0, 0; 0.125,0.2665; 0.25,0.4; 0.375,0.465; 0.5,0.5;  0.625,0.535; 0.75,0.6; 0.875,0.7335; 1,1">
+                                          <p:stCondLst>
+                                            <p:cond delay="1656"/>
+                                          </p:stCondLst>
+                                        </p:cTn>
+                                        <p:tgtEl>
+                                          <p:spTgt spid="9"/>
+                                        </p:tgtEl>
+                                        <p:attrNameLst>
+                                          <p:attrName>ppt_y</p:attrName>
+                                        </p:attrNameLst>
+                                      </p:cBhvr>
+                                      <p:tavLst>
+                                        <p:tav tm="0" fmla="#ppt_y-sin(pi*$)/81">
+                                          <p:val>
+                                            <p:fltVal val="0"/>
+                                          </p:val>
+                                        </p:tav>
+                                        <p:tav tm="100000">
+                                          <p:val>
+                                            <p:fltVal val="1"/>
+                                          </p:val>
+                                        </p:tav>
+                                      </p:tavLst>
+                                    </p:anim>
+                                    <p:animScale>
+                                      <p:cBhvr>
+                                        <p:cTn id="34" dur="26">
+                                          <p:stCondLst>
+                                            <p:cond delay="650"/>
+                                          </p:stCondLst>
+                                        </p:cTn>
+                                        <p:tgtEl>
+                                          <p:spTgt spid="9"/>
+                                        </p:tgtEl>
+                                      </p:cBhvr>
+                                      <p:to x="100000" y="60000"/>
+                                    </p:animScale>
+                                    <p:animScale>
+                                      <p:cBhvr>
+                                        <p:cTn id="35" dur="166" decel="50000">
+                                          <p:stCondLst>
+                                            <p:cond delay="676"/>
+                                          </p:stCondLst>
+                                        </p:cTn>
+                                        <p:tgtEl>
+                                          <p:spTgt spid="9"/>
+                                        </p:tgtEl>
+                                      </p:cBhvr>
+                                      <p:to x="100000" y="100000"/>
+                                    </p:animScale>
+                                    <p:animScale>
+                                      <p:cBhvr>
+                                        <p:cTn id="36" dur="26">
+                                          <p:stCondLst>
+                                            <p:cond delay="1312"/>
+                                          </p:stCondLst>
+                                        </p:cTn>
+                                        <p:tgtEl>
+                                          <p:spTgt spid="9"/>
+                                        </p:tgtEl>
+                                      </p:cBhvr>
+                                      <p:to x="100000" y="80000"/>
+                                    </p:animScale>
+                                    <p:animScale>
+                                      <p:cBhvr>
+                                        <p:cTn id="37" dur="166" decel="50000">
+                                          <p:stCondLst>
+                                            <p:cond delay="1338"/>
+                                          </p:stCondLst>
+                                        </p:cTn>
+                                        <p:tgtEl>
+                                          <p:spTgt spid="9"/>
+                                        </p:tgtEl>
+                                      </p:cBhvr>
+                                      <p:to x="100000" y="100000"/>
+                                    </p:animScale>
+                                    <p:animScale>
+                                      <p:cBhvr>
+                                        <p:cTn id="38" dur="26">
+                                          <p:stCondLst>
+                                            <p:cond delay="1642"/>
+                                          </p:stCondLst>
+                                        </p:cTn>
+                                        <p:tgtEl>
+                                          <p:spTgt spid="9"/>
+                                        </p:tgtEl>
+                                      </p:cBhvr>
+                                      <p:to x="100000" y="90000"/>
+                                    </p:animScale>
+                                    <p:animScale>
+                                      <p:cBhvr>
+                                        <p:cTn id="39" dur="166" decel="50000">
+                                          <p:stCondLst>
+                                            <p:cond delay="1668"/>
+                                          </p:stCondLst>
+                                        </p:cTn>
+                                        <p:tgtEl>
+                                          <p:spTgt spid="9"/>
+                                        </p:tgtEl>
+                                      </p:cBhvr>
+                                      <p:to x="100000" y="100000"/>
+                                    </p:animScale>
+                                    <p:animScale>
+                                      <p:cBhvr>
+                                        <p:cTn id="40" dur="26">
+                                          <p:stCondLst>
+                                            <p:cond delay="1808"/>
+                                          </p:stCondLst>
+                                        </p:cTn>
+                                        <p:tgtEl>
+                                          <p:spTgt spid="9"/>
+                                        </p:tgtEl>
+                                      </p:cBhvr>
+                                      <p:to x="100000" y="95000"/>
+                                    </p:animScale>
+                                    <p:animScale>
+                                      <p:cBhvr>
+                                        <p:cTn id="41" dur="166" decel="50000">
+                                          <p:stCondLst>
+                                            <p:cond delay="1834"/>
+                                          </p:stCondLst>
+                                        </p:cTn>
+                                        <p:tgtEl>
+                                          <p:spTgt spid="9"/>
+                                        </p:tgtEl>
+                                      </p:cBhvr>
+                                      <p:to x="100000" y="100000"/>
+                                    </p:animScale>
+                                  </p:childTnLst>
+                                </p:cTn>
+                              </p:par>
+                            </p:childTnLst>
+                          </p:cTn>
+                        </p:par>
+                      </p:childTnLst>
+                    </p:cTn>
+                  </p:par>
+                </p:childTnLst>
+              </p:cTn>
+              <p:prevCondLst>
+                <p:cond evt="onPrev" delay="0">
+                  <p:tgtEl>
+                    <p:sldTgt/>
+                  </p:tgtEl>
+                </p:cond>
+              </p:prevCondLst>
+              <p:nextCondLst>
+                <p:cond evt="onNext" delay="0">
+                  <p:tgtEl>
+                    <p:sldTgt/>
+                  </p:tgtEl>
+                </p:cond>
+              </p:nextCondLst>
+            </p:seq>
+          </p:childTnLst>
+        </p:cTn>
+      </p:par>
+    </p:tnLst>
+    <p:bldLst>
+      <p:bldP spid="3" grpId="0" build="p"/>
+      <p:bldP spid="4" grpId="0"/>
+      <p:bldP spid="5" grpId="0"/>
+      <p:bldP spid="6" grpId="0"/>
+      <p:bldP spid="7" grpId="0"/>
+      <p:bldP spid="9" grpId="0"/>
+    </p:bldLst>
+  </p:timing>
+</p:sld>
+</file>
+
 <file path=ppt/slides/slide2.xml><?xml version="1.0" encoding="utf-8"?>
 <p:sld xmlns:a="http://schemas.openxmlformats.org/drawingml/2006/main" xmlns:r="http://schemas.openxmlformats.org/officeDocument/2006/relationships" xmlns:p="http://schemas.openxmlformats.org/presentationml/2006/main">
   <p:cSld>
@@ -26319,14 +27203,22 @@
             <p:ph type="title"/>
           </p:nvPr>
         </p:nvSpPr>
-        <p:spPr/>
+        <p:spPr>
+          <a:xfrm>
+            <a:off x="1141413" y="639784"/>
+            <a:ext cx="9905998" cy="614859"/>
+          </a:xfrm>
+        </p:spPr>
         <p:txBody>
-          <a:bodyPr/>
+          <a:bodyPr>
+            <a:normAutofit/>
+          </a:bodyPr>
           <a:lstStyle/>
           <a:p>
+            <a:pPr rtl="0"/>
             <a:r>
               <a:rPr lang="en-US" dirty="0"/>
-              <a:t>Questions</a:t>
+              <a:t>Back to Concepts</a:t>
             </a:r>
             <a:endParaRPr lang="he-IL" dirty="0"/>
           </a:p>
@@ -26344,12 +27236,14 @@
         </p:nvSpPr>
         <p:spPr>
           <a:xfrm>
-            <a:off x="1141412" y="2249487"/>
-            <a:ext cx="9905999" cy="560825"/>
+            <a:off x="1141412" y="1254643"/>
+            <a:ext cx="9905999" cy="1922190"/>
           </a:xfrm>
         </p:spPr>
         <p:txBody>
-          <a:bodyPr/>
+          <a:bodyPr>
+            <a:normAutofit fontScale="92500"/>
+          </a:bodyPr>
           <a:lstStyle/>
           <a:p>
             <a:pPr marL="0" indent="0" algn="l" rtl="0">
@@ -26357,21 +27251,45 @@
             </a:pPr>
             <a:r>
               <a:rPr lang="en-US" dirty="0"/>
-              <a:t>If you have any questions, speak now or for ever hold your peace.</a:t>
+              <a:t>Concepts got a special attention in C++20 and made it possible to move more elements from the runtime evaluation to the compile-time evaluation. In additional for this, it made it possible to help the compiler know more specific details about our template parameters ahead- Even before we made the call for them.</a:t>
             </a:r>
           </a:p>
         </p:txBody>
       </p:sp>
+      <p:pic>
+        <p:nvPicPr>
+          <p:cNvPr id="11" name="Picture 10"/>
+          <p:cNvPicPr>
+            <a:picLocks noChangeAspect="1"/>
+          </p:cNvPicPr>
+          <p:nvPr/>
+        </p:nvPicPr>
+        <p:blipFill>
+          <a:blip r:embed="rId2"/>
+          <a:stretch>
+            <a:fillRect/>
+          </a:stretch>
+        </p:blipFill>
+        <p:spPr>
+          <a:xfrm>
+            <a:off x="1141412" y="3357576"/>
+            <a:ext cx="4724400" cy="1590675"/>
+          </a:xfrm>
+          <a:prstGeom prst="rect">
+            <a:avLst/>
+          </a:prstGeom>
+        </p:spPr>
+      </p:pic>
       <p:sp>
         <p:nvSpPr>
-          <p:cNvPr id="4" name="TextBox 3"/>
+          <p:cNvPr id="12" name="TextBox 11"/>
           <p:cNvSpPr txBox="1"/>
           <p:nvPr/>
         </p:nvSpPr>
         <p:spPr>
           <a:xfrm>
-            <a:off x="1141412" y="2810312"/>
-            <a:ext cx="2954207" cy="369332"/>
+            <a:off x="1141411" y="2996075"/>
+            <a:ext cx="3964996" cy="369332"/>
           </a:xfrm>
           <a:prstGeom prst="rect">
             <a:avLst/>
@@ -26386,7 +27304,7 @@
           <a:p>
             <a:r>
               <a:rPr lang="en-US" dirty="0"/>
-              <a:t>Or at least until you’ll be near</a:t>
+              <a:t>Take for example the following interface:</a:t>
             </a:r>
             <a:endParaRPr lang="he-IL" dirty="0"/>
           </a:p>
@@ -26394,14 +27312,14 @@
       </p:sp>
       <p:sp>
         <p:nvSpPr>
-          <p:cNvPr id="5" name="TextBox 4"/>
+          <p:cNvPr id="18" name="TextBox 17"/>
           <p:cNvSpPr txBox="1"/>
           <p:nvPr/>
         </p:nvSpPr>
         <p:spPr>
           <a:xfrm>
-            <a:off x="1283516" y="3632433"/>
-            <a:ext cx="2147254" cy="369332"/>
+            <a:off x="1141411" y="4948251"/>
+            <a:ext cx="10098534" cy="369332"/>
           </a:xfrm>
           <a:prstGeom prst="rect">
             <a:avLst/>
@@ -26416,26 +27334,45 @@
           <a:p>
             <a:r>
               <a:rPr lang="en-US" dirty="0"/>
-              <a:t>LinkedIn: /</a:t>
+              <a:t>Assume we want to create a class which inherit from a template parameter that have to inherit this interface.</a:t>
             </a:r>
-            <a:r>
-              <a:rPr lang="en-US" dirty="0" err="1"/>
-              <a:t>koralkashri</a:t>
-            </a:r>
-            <a:endParaRPr lang="he-IL" dirty="0"/>
           </a:p>
         </p:txBody>
       </p:sp>
+      <p:pic>
+        <p:nvPicPr>
+          <p:cNvPr id="20" name="Picture 19"/>
+          <p:cNvPicPr>
+            <a:picLocks noChangeAspect="1"/>
+          </p:cNvPicPr>
+          <p:nvPr/>
+        </p:nvPicPr>
+        <p:blipFill>
+          <a:blip r:embed="rId3"/>
+          <a:stretch>
+            <a:fillRect/>
+          </a:stretch>
+        </p:blipFill>
+        <p:spPr>
+          <a:xfrm>
+            <a:off x="1141410" y="5317583"/>
+            <a:ext cx="7972425" cy="1209675"/>
+          </a:xfrm>
+          <a:prstGeom prst="rect">
+            <a:avLst/>
+          </a:prstGeom>
+        </p:spPr>
+      </p:pic>
       <p:sp>
         <p:nvSpPr>
-          <p:cNvPr id="6" name="TextBox 5"/>
+          <p:cNvPr id="21" name="TextBox 20"/>
           <p:cNvSpPr txBox="1"/>
           <p:nvPr/>
         </p:nvSpPr>
         <p:spPr>
           <a:xfrm>
-            <a:off x="6459523" y="3632433"/>
-            <a:ext cx="2860398" cy="369332"/>
+            <a:off x="1141410" y="2994659"/>
+            <a:ext cx="10338599" cy="369332"/>
           </a:xfrm>
           <a:prstGeom prst="rect">
             <a:avLst/>
@@ -26450,22 +27387,46 @@
           <a:p>
             <a:r>
               <a:rPr lang="en-US" dirty="0"/>
-              <a:t>Mail: koralkashri@gmail.com</a:t>
+              <a:t>With a wrong usage we’ll get a great compilation error, which will mark the class implementation as a mistake:</a:t>
             </a:r>
             <a:endParaRPr lang="he-IL" dirty="0"/>
           </a:p>
         </p:txBody>
       </p:sp>
+      <p:pic>
+        <p:nvPicPr>
+          <p:cNvPr id="23" name="Picture 22"/>
+          <p:cNvPicPr>
+            <a:picLocks noChangeAspect="1"/>
+          </p:cNvPicPr>
+          <p:nvPr/>
+        </p:nvPicPr>
+        <p:blipFill>
+          <a:blip r:embed="rId4"/>
+          <a:stretch>
+            <a:fillRect/>
+          </a:stretch>
+        </p:blipFill>
+        <p:spPr>
+          <a:xfrm>
+            <a:off x="1141409" y="3363991"/>
+            <a:ext cx="10078955" cy="1608526"/>
+          </a:xfrm>
+          <a:prstGeom prst="rect">
+            <a:avLst/>
+          </a:prstGeom>
+        </p:spPr>
+      </p:pic>
       <p:sp>
         <p:nvSpPr>
-          <p:cNvPr id="7" name="TextBox 6"/>
+          <p:cNvPr id="26" name="TextBox 25"/>
           <p:cNvSpPr txBox="1"/>
           <p:nvPr/>
         </p:nvSpPr>
         <p:spPr>
           <a:xfrm>
-            <a:off x="1283516" y="4001765"/>
-            <a:ext cx="2074927" cy="369332"/>
+            <a:off x="1141408" y="4950075"/>
+            <a:ext cx="7002366" cy="369332"/>
           </a:xfrm>
           <a:prstGeom prst="rect">
             <a:avLst/>
@@ -26480,26 +27441,70 @@
           <a:p>
             <a:r>
               <a:rPr lang="en-US" dirty="0"/>
-              <a:t>GitHub: /</a:t>
-            </a:r>
-            <a:r>
-              <a:rPr lang="en-US" dirty="0" err="1"/>
-              <a:t>koralkashri</a:t>
+              <a:t>To fix this issue, and to be more clear at compile time, we can use concepts:</a:t>
             </a:r>
             <a:endParaRPr lang="he-IL" dirty="0"/>
           </a:p>
         </p:txBody>
       </p:sp>
+      <p:pic>
+        <p:nvPicPr>
+          <p:cNvPr id="27" name="Picture 26"/>
+          <p:cNvPicPr>
+            <a:picLocks noChangeAspect="1"/>
+          </p:cNvPicPr>
+          <p:nvPr/>
+        </p:nvPicPr>
+        <p:blipFill>
+          <a:blip r:embed="rId5"/>
+          <a:stretch>
+            <a:fillRect/>
+          </a:stretch>
+        </p:blipFill>
+        <p:spPr>
+          <a:xfrm>
+            <a:off x="1141410" y="5316167"/>
+            <a:ext cx="6226953" cy="1413526"/>
+          </a:xfrm>
+          <a:prstGeom prst="rect">
+            <a:avLst/>
+          </a:prstGeom>
+        </p:spPr>
+      </p:pic>
+      <p:pic>
+        <p:nvPicPr>
+          <p:cNvPr id="28" name="Picture 27"/>
+          <p:cNvPicPr>
+            <a:picLocks noChangeAspect="1"/>
+          </p:cNvPicPr>
+          <p:nvPr/>
+        </p:nvPicPr>
+        <p:blipFill>
+          <a:blip r:embed="rId6"/>
+          <a:stretch>
+            <a:fillRect/>
+          </a:stretch>
+        </p:blipFill>
+        <p:spPr>
+          <a:xfrm>
+            <a:off x="1135859" y="3364982"/>
+            <a:ext cx="10344150" cy="1590675"/>
+          </a:xfrm>
+          <a:prstGeom prst="rect">
+            <a:avLst/>
+          </a:prstGeom>
+        </p:spPr>
+      </p:pic>
       <p:sp>
         <p:nvSpPr>
-          <p:cNvPr id="9" name="TextBox 8"/>
+          <p:cNvPr id="29" name="TextBox 28"/>
           <p:cNvSpPr txBox="1"/>
           <p:nvPr/>
         </p:nvSpPr>
         <p:spPr>
           <a:xfrm>
-            <a:off x="6459523" y="4001765"/>
-            <a:ext cx="2146806" cy="369332"/>
+            <a:off x="1135859" y="2994659"/>
+            <a:ext cx="4309898" cy="369332"/>
           </a:xfrm>
           <a:prstGeom prst="rect">
             <a:avLst/>
@@ -26514,11 +27519,7 @@
           <a:p>
             <a:r>
               <a:rPr lang="en-US" dirty="0"/>
-              <a:t>Twitter: @</a:t>
-            </a:r>
-            <a:r>
-              <a:rPr lang="en-US" dirty="0" err="1"/>
-              <a:t>koralkashri</a:t>
+              <a:t>And now the error we get from wrong usage:</a:t>
             </a:r>
             <a:endParaRPr lang="he-IL" dirty="0"/>
           </a:p>
@@ -26527,7 +27528,7 @@
     </p:spTree>
     <p:extLst>
       <p:ext uri="{BB962C8B-B14F-4D97-AF65-F5344CB8AC3E}">
-        <p14:creationId xmlns:p14="http://schemas.microsoft.com/office/powerpoint/2010/main" val="1977489723"/>
+        <p14:creationId xmlns:p14="http://schemas.microsoft.com/office/powerpoint/2010/main" val="2650848840"/>
       </p:ext>
     </p:extLst>
   </p:cSld>
@@ -26654,27 +27655,36 @@
                             </p:childTnLst>
                           </p:cTn>
                         </p:par>
+                      </p:childTnLst>
+                    </p:cTn>
+                  </p:par>
+                  <p:par>
+                    <p:cTn id="10" fill="hold">
+                      <p:stCondLst>
+                        <p:cond delay="indefinite"/>
+                      </p:stCondLst>
+                      <p:childTnLst>
                         <p:par>
-                          <p:cTn id="10" fill="hold">
+                          <p:cTn id="11" fill="hold">
                             <p:stCondLst>
-                              <p:cond delay="1000"/>
+                              <p:cond delay="0"/>
                             </p:stCondLst>
                             <p:childTnLst>
                               <p:par>
-                                <p:cTn id="11" presetID="16" presetClass="entr" presetSubtype="21" fill="hold" grpId="0" nodeType="afterEffect">
+                                <p:cTn id="12" presetID="10" presetClass="entr" presetSubtype="0" fill="hold" grpId="0" nodeType="clickEffect">
                                   <p:stCondLst>
-                                    <p:cond delay="500"/>
+                                    <p:cond delay="0"/>
                                   </p:stCondLst>
                                   <p:childTnLst>
                                     <p:set>
                                       <p:cBhvr>
-                                        <p:cTn id="12" dur="1" fill="hold">
+                                        <p:cTn id="13" dur="1" fill="hold">
                                           <p:stCondLst>
                                             <p:cond delay="0"/>
                                           </p:stCondLst>
                                         </p:cTn>
                                         <p:tgtEl>
-                                          <p:spTgt spid="4"/>
+                                          <p:spTgt spid="12"/>
                                         </p:tgtEl>
                                         <p:attrNameLst>
                                           <p:attrName>style.visibility</p:attrName>
@@ -26684,11 +27694,11 @@
                                         <p:strVal val="visible"/>
                                       </p:to>
                                     </p:set>
-                                    <p:animEffect transition="in" filter="barn(inVertical)">
+                                    <p:animEffect transition="in" filter="fade">
                                       <p:cBhvr>
-                                        <p:cTn id="13" dur="500"/>
-                                        <p:tgtEl>
-                                          <p:spTgt spid="4"/>
+                                        <p:cTn id="14" dur="500"/>
+                                        <p:tgtEl>
+                                          <p:spTgt spid="12"/>
                                         </p:tgtEl>
                                       </p:cBhvr>
                                     </p:animEffect>
@@ -26699,26 +27709,26 @@
                           </p:cTn>
                         </p:par>
                         <p:par>
-                          <p:cTn id="14" fill="hold">
+                          <p:cTn id="15" fill="hold">
                             <p:stCondLst>
-                              <p:cond delay="2000"/>
+                              <p:cond delay="500"/>
                             </p:stCondLst>
                             <p:childTnLst>
                               <p:par>
-                                <p:cTn id="15" presetID="14" presetClass="entr" presetSubtype="10" fill="hold" grpId="0" nodeType="afterEffect">
+                                <p:cTn id="16" presetID="14" presetClass="entr" presetSubtype="10" fill="hold" nodeType="afterEffect">
                                   <p:stCondLst>
-                                    <p:cond delay="500"/>
+                                    <p:cond delay="0"/>
                                   </p:stCondLst>
                                   <p:childTnLst>
                                     <p:set>
                                       <p:cBhvr>
-                                        <p:cTn id="16" dur="1" fill="hold">
+                                        <p:cTn id="17" dur="1" fill="hold">
                                           <p:stCondLst>
                                             <p:cond delay="0"/>
                                           </p:stCondLst>
                                         </p:cTn>
                                         <p:tgtEl>
-                                          <p:spTgt spid="5"/>
+                                          <p:spTgt spid="11"/>
                                         </p:tgtEl>
                                         <p:attrNameLst>
                                           <p:attrName>style.visibility</p:attrName>
@@ -26730,55 +27740,41 @@
                                     </p:set>
                                     <p:animEffect transition="in" filter="randombar(horizontal)">
                                       <p:cBhvr>
-                                        <p:cTn id="17" dur="500"/>
-                                        <p:tgtEl>
-                                          <p:spTgt spid="5"/>
+                                        <p:cTn id="18" dur="500"/>
+                                        <p:tgtEl>
+                                          <p:spTgt spid="11"/>
                                         </p:tgtEl>
                                       </p:cBhvr>
                                     </p:animEffect>
                                   </p:childTnLst>
                                 </p:cTn>
                               </p:par>
+                            </p:childTnLst>
+                          </p:cTn>
+                        </p:par>
+                      </p:childTnLst>
+                    </p:cTn>
+                  </p:par>
+                  <p:par>
+                    <p:cTn id="19" fill="hold">
+                      <p:stCondLst>
+                        <p:cond delay="indefinite"/>
+                      </p:stCondLst>
+                      <p:childTnLst>
+                        <p:par>
+                          <p:cTn id="20" fill="hold">
+                            <p:stCondLst>
+                              <p:cond delay="0"/>
+                            </p:stCondLst>
+                            <p:childTnLst>
                               <p:par>
-                                <p:cTn id="18" presetID="6" presetClass="entr" presetSubtype="16" fill="hold" grpId="0" nodeType="withEffect">
+                                <p:cTn id="21" presetID="10" presetClass="entr" presetSubtype="0" fill="hold" grpId="0" nodeType="clickEffect">
                                   <p:stCondLst>
-                                    <p:cond delay="500"/>
+                                    <p:cond delay="0"/>
                                   </p:stCondLst>
-                                  <p:childTnLst>
-                                    <p:set>
-                                      <p:cBhvr>
-                                        <p:cTn id="19" dur="1" fill="hold">
-                                          <p:stCondLst>
-                                            <p:cond delay="0"/>
-                                          </p:stCondLst>
-                                        </p:cTn>
-                                        <p:tgtEl>
-                                          <p:spTgt spid="7"/>
-                                        </p:tgtEl>
-                                        <p:attrNameLst>
-                                          <p:attrName>style.visibility</p:attrName>
-                                        </p:attrNameLst>
-                                      </p:cBhvr>
-                                      <p:to>
-                                        <p:strVal val="visible"/>
-                                      </p:to>
-                                    </p:set>
-                                    <p:animEffect transition="in" filter="circle(in)">
-                                      <p:cBhvr>
-                                        <p:cTn id="20" dur="2000"/>
-                                        <p:tgtEl>
-                                          <p:spTgt spid="7"/>
-                                        </p:tgtEl>
-                                      </p:cBhvr>
-                                    </p:animEffect>
-                                  </p:childTnLst>
-                                </p:cTn>
-                              </p:par>
-                              <p:par>
-                                <p:cTn id="21" presetID="45" presetClass="entr" presetSubtype="0" fill="hold" grpId="0" nodeType="withEffect">
-                                  <p:stCondLst>
-                                    <p:cond delay="500"/>
-                                  </p:stCondLst>
+                                  <p:iterate type="wd">
+                                    <p:tmPct val="10000"/>
+                                  </p:iterate>
                                   <p:childTnLst>
                                     <p:set>
                                       <p:cBhvr>
@@ -26788,7 +27784,7 @@
                                           </p:stCondLst>
                                         </p:cTn>
                                         <p:tgtEl>
-                                          <p:spTgt spid="6"/>
+                                          <p:spTgt spid="18"/>
                                         </p:tgtEl>
                                         <p:attrNameLst>
                                           <p:attrName>style.visibility</p:attrName>
@@ -26800,17 +27796,722 @@
                                     </p:set>
                                     <p:animEffect transition="in" filter="fade">
                                       <p:cBhvr>
-                                        <p:cTn id="23" dur="2000"/>
-                                        <p:tgtEl>
-                                          <p:spTgt spid="6"/>
+                                        <p:cTn id="23" dur="500"/>
+                                        <p:tgtEl>
+                                          <p:spTgt spid="18"/>
+                                        </p:tgtEl>
+                                      </p:cBhvr>
+                                    </p:animEffect>
+                                  </p:childTnLst>
+                                </p:cTn>
+                              </p:par>
+                            </p:childTnLst>
+                          </p:cTn>
+                        </p:par>
+                        <p:par>
+                          <p:cTn id="24" fill="hold">
+                            <p:stCondLst>
+                              <p:cond delay="1450"/>
+                            </p:stCondLst>
+                            <p:childTnLst>
+                              <p:par>
+                                <p:cTn id="25" presetID="21" presetClass="entr" presetSubtype="1" fill="hold" nodeType="afterEffect">
+                                  <p:stCondLst>
+                                    <p:cond delay="0"/>
+                                  </p:stCondLst>
+                                  <p:childTnLst>
+                                    <p:set>
+                                      <p:cBhvr>
+                                        <p:cTn id="26" dur="1" fill="hold">
+                                          <p:stCondLst>
+                                            <p:cond delay="0"/>
+                                          </p:stCondLst>
+                                        </p:cTn>
+                                        <p:tgtEl>
+                                          <p:spTgt spid="20"/>
+                                        </p:tgtEl>
+                                        <p:attrNameLst>
+                                          <p:attrName>style.visibility</p:attrName>
+                                        </p:attrNameLst>
+                                      </p:cBhvr>
+                                      <p:to>
+                                        <p:strVal val="visible"/>
+                                      </p:to>
+                                    </p:set>
+                                    <p:animEffect transition="in" filter="wheel(1)">
+                                      <p:cBhvr>
+                                        <p:cTn id="27" dur="1000"/>
+                                        <p:tgtEl>
+                                          <p:spTgt spid="20"/>
+                                        </p:tgtEl>
+                                      </p:cBhvr>
+                                    </p:animEffect>
+                                  </p:childTnLst>
+                                </p:cTn>
+                              </p:par>
+                            </p:childTnLst>
+                          </p:cTn>
+                        </p:par>
+                      </p:childTnLst>
+                    </p:cTn>
+                  </p:par>
+                  <p:par>
+                    <p:cTn id="28" fill="hold">
+                      <p:stCondLst>
+                        <p:cond delay="indefinite"/>
+                      </p:stCondLst>
+                      <p:childTnLst>
+                        <p:par>
+                          <p:cTn id="29" fill="hold">
+                            <p:stCondLst>
+                              <p:cond delay="0"/>
+                            </p:stCondLst>
+                            <p:childTnLst>
+                              <p:par>
+                                <p:cTn id="30" presetID="10" presetClass="exit" presetSubtype="0" fill="hold" grpId="1" nodeType="clickEffect">
+                                  <p:stCondLst>
+                                    <p:cond delay="0"/>
+                                  </p:stCondLst>
+                                  <p:childTnLst>
+                                    <p:animEffect transition="out" filter="fade">
+                                      <p:cBhvr>
+                                        <p:cTn id="31" dur="500"/>
+                                        <p:tgtEl>
+                                          <p:spTgt spid="12"/>
+                                        </p:tgtEl>
+                                      </p:cBhvr>
+                                    </p:animEffect>
+                                    <p:set>
+                                      <p:cBhvr>
+                                        <p:cTn id="32" dur="1" fill="hold">
+                                          <p:stCondLst>
+                                            <p:cond delay="499"/>
+                                          </p:stCondLst>
+                                        </p:cTn>
+                                        <p:tgtEl>
+                                          <p:spTgt spid="12"/>
+                                        </p:tgtEl>
+                                        <p:attrNameLst>
+                                          <p:attrName>style.visibility</p:attrName>
+                                        </p:attrNameLst>
+                                      </p:cBhvr>
+                                      <p:to>
+                                        <p:strVal val="hidden"/>
+                                      </p:to>
+                                    </p:set>
+                                  </p:childTnLst>
+                                </p:cTn>
+                              </p:par>
+                            </p:childTnLst>
+                          </p:cTn>
+                        </p:par>
+                        <p:par>
+                          <p:cTn id="33" fill="hold">
+                            <p:stCondLst>
+                              <p:cond delay="500"/>
+                            </p:stCondLst>
+                            <p:childTnLst>
+                              <p:par>
+                                <p:cTn id="34" presetID="31" presetClass="exit" presetSubtype="0" fill="hold" nodeType="afterEffect">
+                                  <p:stCondLst>
+                                    <p:cond delay="0"/>
+                                  </p:stCondLst>
+                                  <p:childTnLst>
+                                    <p:anim calcmode="lin" valueType="num">
+                                      <p:cBhvr>
+                                        <p:cTn id="35" dur="1000"/>
+                                        <p:tgtEl>
+                                          <p:spTgt spid="11"/>
+                                        </p:tgtEl>
+                                        <p:attrNameLst>
+                                          <p:attrName>ppt_w</p:attrName>
+                                        </p:attrNameLst>
+                                      </p:cBhvr>
+                                      <p:tavLst>
+                                        <p:tav tm="0">
+                                          <p:val>
+                                            <p:strVal val="ppt_w"/>
+                                          </p:val>
+                                        </p:tav>
+                                        <p:tav tm="100000">
+                                          <p:val>
+                                            <p:fltVal val="0"/>
+                                          </p:val>
+                                        </p:tav>
+                                      </p:tavLst>
+                                    </p:anim>
+                                    <p:anim calcmode="lin" valueType="num">
+                                      <p:cBhvr>
+                                        <p:cTn id="36" dur="1000"/>
+                                        <p:tgtEl>
+                                          <p:spTgt spid="11"/>
+                                        </p:tgtEl>
+                                        <p:attrNameLst>
+                                          <p:attrName>ppt_h</p:attrName>
+                                        </p:attrNameLst>
+                                      </p:cBhvr>
+                                      <p:tavLst>
+                                        <p:tav tm="0">
+                                          <p:val>
+                                            <p:strVal val="ppt_h"/>
+                                          </p:val>
+                                        </p:tav>
+                                        <p:tav tm="100000">
+                                          <p:val>
+                                            <p:fltVal val="0"/>
+                                          </p:val>
+                                        </p:tav>
+                                      </p:tavLst>
+                                    </p:anim>
+                                    <p:anim calcmode="lin" valueType="num">
+                                      <p:cBhvr>
+                                        <p:cTn id="37" dur="1000"/>
+                                        <p:tgtEl>
+                                          <p:spTgt spid="11"/>
+                                        </p:tgtEl>
+                                        <p:attrNameLst>
+                                          <p:attrName>style.rotation</p:attrName>
+                                        </p:attrNameLst>
+                                      </p:cBhvr>
+                                      <p:tavLst>
+                                        <p:tav tm="0">
+                                          <p:val>
+                                            <p:fltVal val="0"/>
+                                          </p:val>
+                                        </p:tav>
+                                        <p:tav tm="100000">
+                                          <p:val>
+                                            <p:fltVal val="90"/>
+                                          </p:val>
+                                        </p:tav>
+                                      </p:tavLst>
+                                    </p:anim>
+                                    <p:animEffect transition="out" filter="fade">
+                                      <p:cBhvr>
+                                        <p:cTn id="38" dur="1000"/>
+                                        <p:tgtEl>
+                                          <p:spTgt spid="11"/>
+                                        </p:tgtEl>
+                                      </p:cBhvr>
+                                    </p:animEffect>
+                                    <p:set>
+                                      <p:cBhvr>
+                                        <p:cTn id="39" dur="1" fill="hold">
+                                          <p:stCondLst>
+                                            <p:cond delay="999"/>
+                                          </p:stCondLst>
+                                        </p:cTn>
+                                        <p:tgtEl>
+                                          <p:spTgt spid="11"/>
+                                        </p:tgtEl>
+                                        <p:attrNameLst>
+                                          <p:attrName>style.visibility</p:attrName>
+                                        </p:attrNameLst>
+                                      </p:cBhvr>
+                                      <p:to>
+                                        <p:strVal val="hidden"/>
+                                      </p:to>
+                                    </p:set>
+                                  </p:childTnLst>
+                                </p:cTn>
+                              </p:par>
+                            </p:childTnLst>
+                          </p:cTn>
+                        </p:par>
+                      </p:childTnLst>
+                    </p:cTn>
+                  </p:par>
+                  <p:par>
+                    <p:cTn id="40" fill="hold">
+                      <p:stCondLst>
+                        <p:cond delay="indefinite"/>
+                      </p:stCondLst>
+                      <p:childTnLst>
+                        <p:par>
+                          <p:cTn id="41" fill="hold">
+                            <p:stCondLst>
+                              <p:cond delay="0"/>
+                            </p:stCondLst>
+                            <p:childTnLst>
+                              <p:par>
+                                <p:cTn id="42" presetID="10" presetClass="entr" presetSubtype="0" fill="hold" grpId="0" nodeType="clickEffect">
+                                  <p:stCondLst>
+                                    <p:cond delay="0"/>
+                                  </p:stCondLst>
+                                  <p:childTnLst>
+                                    <p:set>
+                                      <p:cBhvr>
+                                        <p:cTn id="43" dur="1" fill="hold">
+                                          <p:stCondLst>
+                                            <p:cond delay="0"/>
+                                          </p:stCondLst>
+                                        </p:cTn>
+                                        <p:tgtEl>
+                                          <p:spTgt spid="21"/>
+                                        </p:tgtEl>
+                                        <p:attrNameLst>
+                                          <p:attrName>style.visibility</p:attrName>
+                                        </p:attrNameLst>
+                                      </p:cBhvr>
+                                      <p:to>
+                                        <p:strVal val="visible"/>
+                                      </p:to>
+                                    </p:set>
+                                    <p:animEffect transition="in" filter="fade">
+                                      <p:cBhvr>
+                                        <p:cTn id="44" dur="500"/>
+                                        <p:tgtEl>
+                                          <p:spTgt spid="21"/>
+                                        </p:tgtEl>
+                                      </p:cBhvr>
+                                    </p:animEffect>
+                                  </p:childTnLst>
+                                </p:cTn>
+                              </p:par>
+                            </p:childTnLst>
+                          </p:cTn>
+                        </p:par>
+                        <p:par>
+                          <p:cTn id="45" fill="hold">
+                            <p:stCondLst>
+                              <p:cond delay="500"/>
+                            </p:stCondLst>
+                            <p:childTnLst>
+                              <p:par>
+                                <p:cTn id="46" presetID="31" presetClass="entr" presetSubtype="0" fill="hold" nodeType="afterEffect">
+                                  <p:stCondLst>
+                                    <p:cond delay="0"/>
+                                  </p:stCondLst>
+                                  <p:childTnLst>
+                                    <p:set>
+                                      <p:cBhvr>
+                                        <p:cTn id="47" dur="1" fill="hold">
+                                          <p:stCondLst>
+                                            <p:cond delay="0"/>
+                                          </p:stCondLst>
+                                        </p:cTn>
+                                        <p:tgtEl>
+                                          <p:spTgt spid="23"/>
+                                        </p:tgtEl>
+                                        <p:attrNameLst>
+                                          <p:attrName>style.visibility</p:attrName>
+                                        </p:attrNameLst>
+                                      </p:cBhvr>
+                                      <p:to>
+                                        <p:strVal val="visible"/>
+                                      </p:to>
+                                    </p:set>
+                                    <p:anim calcmode="lin" valueType="num">
+                                      <p:cBhvr>
+                                        <p:cTn id="48" dur="1000" fill="hold"/>
+                                        <p:tgtEl>
+                                          <p:spTgt spid="23"/>
+                                        </p:tgtEl>
+                                        <p:attrNameLst>
+                                          <p:attrName>ppt_w</p:attrName>
+                                        </p:attrNameLst>
+                                      </p:cBhvr>
+                                      <p:tavLst>
+                                        <p:tav tm="0">
+                                          <p:val>
+                                            <p:fltVal val="0"/>
+                                          </p:val>
+                                        </p:tav>
+                                        <p:tav tm="100000">
+                                          <p:val>
+                                            <p:strVal val="#ppt_w"/>
+                                          </p:val>
+                                        </p:tav>
+                                      </p:tavLst>
+                                    </p:anim>
+                                    <p:anim calcmode="lin" valueType="num">
+                                      <p:cBhvr>
+                                        <p:cTn id="49" dur="1000" fill="hold"/>
+                                        <p:tgtEl>
+                                          <p:spTgt spid="23"/>
+                                        </p:tgtEl>
+                                        <p:attrNameLst>
+                                          <p:attrName>ppt_h</p:attrName>
+                                        </p:attrNameLst>
+                                      </p:cBhvr>
+                                      <p:tavLst>
+                                        <p:tav tm="0">
+                                          <p:val>
+                                            <p:fltVal val="0"/>
+                                          </p:val>
+                                        </p:tav>
+                                        <p:tav tm="100000">
+                                          <p:val>
+                                            <p:strVal val="#ppt_h"/>
+                                          </p:val>
+                                        </p:tav>
+                                      </p:tavLst>
+                                    </p:anim>
+                                    <p:anim calcmode="lin" valueType="num">
+                                      <p:cBhvr>
+                                        <p:cTn id="50" dur="1000" fill="hold"/>
+                                        <p:tgtEl>
+                                          <p:spTgt spid="23"/>
+                                        </p:tgtEl>
+                                        <p:attrNameLst>
+                                          <p:attrName>style.rotation</p:attrName>
+                                        </p:attrNameLst>
+                                      </p:cBhvr>
+                                      <p:tavLst>
+                                        <p:tav tm="0">
+                                          <p:val>
+                                            <p:fltVal val="90"/>
+                                          </p:val>
+                                        </p:tav>
+                                        <p:tav tm="100000">
+                                          <p:val>
+                                            <p:fltVal val="0"/>
+                                          </p:val>
+                                        </p:tav>
+                                      </p:tavLst>
+                                    </p:anim>
+                                    <p:animEffect transition="in" filter="fade">
+                                      <p:cBhvr>
+                                        <p:cTn id="51" dur="1000"/>
+                                        <p:tgtEl>
+                                          <p:spTgt spid="23"/>
+                                        </p:tgtEl>
+                                      </p:cBhvr>
+                                    </p:animEffect>
+                                  </p:childTnLst>
+                                </p:cTn>
+                              </p:par>
+                            </p:childTnLst>
+                          </p:cTn>
+                        </p:par>
+                      </p:childTnLst>
+                    </p:cTn>
+                  </p:par>
+                  <p:par>
+                    <p:cTn id="52" fill="hold">
+                      <p:stCondLst>
+                        <p:cond delay="indefinite"/>
+                      </p:stCondLst>
+                      <p:childTnLst>
+                        <p:par>
+                          <p:cTn id="53" fill="hold">
+                            <p:stCondLst>
+                              <p:cond delay="0"/>
+                            </p:stCondLst>
+                            <p:childTnLst>
+                              <p:par>
+                                <p:cTn id="54" presetID="16" presetClass="exit" presetSubtype="21" fill="hold" grpId="1" nodeType="clickEffect">
+                                  <p:stCondLst>
+                                    <p:cond delay="0"/>
+                                  </p:stCondLst>
+                                  <p:iterate type="wd">
+                                    <p:tmPct val="0"/>
+                                  </p:iterate>
+                                  <p:childTnLst>
+                                    <p:animEffect transition="out" filter="barn(inVertical)">
+                                      <p:cBhvr>
+                                        <p:cTn id="55" dur="500"/>
+                                        <p:tgtEl>
+                                          <p:spTgt spid="18"/>
+                                        </p:tgtEl>
+                                      </p:cBhvr>
+                                    </p:animEffect>
+                                    <p:set>
+                                      <p:cBhvr>
+                                        <p:cTn id="56" dur="1" fill="hold">
+                                          <p:stCondLst>
+                                            <p:cond delay="499"/>
+                                          </p:stCondLst>
+                                        </p:cTn>
+                                        <p:tgtEl>
+                                          <p:spTgt spid="18"/>
+                                        </p:tgtEl>
+                                        <p:attrNameLst>
+                                          <p:attrName>style.visibility</p:attrName>
+                                        </p:attrNameLst>
+                                      </p:cBhvr>
+                                      <p:to>
+                                        <p:strVal val="hidden"/>
+                                      </p:to>
+                                    </p:set>
+                                  </p:childTnLst>
+                                </p:cTn>
+                              </p:par>
+                            </p:childTnLst>
+                          </p:cTn>
+                        </p:par>
+                        <p:par>
+                          <p:cTn id="57" fill="hold">
+                            <p:stCondLst>
+                              <p:cond delay="500"/>
+                            </p:stCondLst>
+                            <p:childTnLst>
+                              <p:par>
+                                <p:cTn id="58" presetID="16" presetClass="entr" presetSubtype="21" fill="hold" grpId="0" nodeType="afterEffect">
+                                  <p:stCondLst>
+                                    <p:cond delay="0"/>
+                                  </p:stCondLst>
+                                  <p:childTnLst>
+                                    <p:set>
+                                      <p:cBhvr>
+                                        <p:cTn id="59" dur="1" fill="hold">
+                                          <p:stCondLst>
+                                            <p:cond delay="0"/>
+                                          </p:stCondLst>
+                                        </p:cTn>
+                                        <p:tgtEl>
+                                          <p:spTgt spid="26"/>
+                                        </p:tgtEl>
+                                        <p:attrNameLst>
+                                          <p:attrName>style.visibility</p:attrName>
+                                        </p:attrNameLst>
+                                      </p:cBhvr>
+                                      <p:to>
+                                        <p:strVal val="visible"/>
+                                      </p:to>
+                                    </p:set>
+                                    <p:animEffect transition="in" filter="barn(inVertical)">
+                                      <p:cBhvr>
+                                        <p:cTn id="60" dur="500"/>
+                                        <p:tgtEl>
+                                          <p:spTgt spid="26"/>
+                                        </p:tgtEl>
+                                      </p:cBhvr>
+                                    </p:animEffect>
+                                  </p:childTnLst>
+                                </p:cTn>
+                              </p:par>
+                            </p:childTnLst>
+                          </p:cTn>
+                        </p:par>
+                        <p:par>
+                          <p:cTn id="61" fill="hold">
+                            <p:stCondLst>
+                              <p:cond delay="1000"/>
+                            </p:stCondLst>
+                            <p:childTnLst>
+                              <p:par>
+                                <p:cTn id="62" presetID="45" presetClass="exit" presetSubtype="0" fill="hold" nodeType="afterEffect">
+                                  <p:stCondLst>
+                                    <p:cond delay="0"/>
+                                  </p:stCondLst>
+                                  <p:childTnLst>
+                                    <p:animEffect transition="out" filter="fade">
+                                      <p:cBhvr>
+                                        <p:cTn id="63" dur="2000"/>
+                                        <p:tgtEl>
+                                          <p:spTgt spid="20"/>
                                         </p:tgtEl>
                                       </p:cBhvr>
                                     </p:animEffect>
                                     <p:anim calcmode="lin" valueType="num">
                                       <p:cBhvr>
-                                        <p:cTn id="24" dur="2000" fill="hold"/>
-                                        <p:tgtEl>
-                                          <p:spTgt spid="6"/>
+                                        <p:cTn id="64" dur="2000"/>
+                                        <p:tgtEl>
+                                          <p:spTgt spid="20"/>
+                                        </p:tgtEl>
+                                        <p:attrNameLst>
+                                          <p:attrName>ppt_w</p:attrName>
+                                        </p:attrNameLst>
+                                      </p:cBhvr>
+                                      <p:tavLst>
+                                        <p:tav tm="0">
+                                          <p:val>
+                                            <p:strVal val="ppt_w"/>
+                                          </p:val>
+                                        </p:tav>
+                                        <p:tav tm="5000">
+                                          <p:val>
+                                            <p:strVal val="0.92*ppt_w"/>
+                                          </p:val>
+                                        </p:tav>
+                                        <p:tav tm="10000">
+                                          <p:val>
+                                            <p:strVal val="0.71*ppt_w"/>
+                                          </p:val>
+                                        </p:tav>
+                                        <p:tav tm="15000">
+                                          <p:val>
+                                            <p:strVal val="0.38*ppt_w"/>
+                                          </p:val>
+                                        </p:tav>
+                                        <p:tav tm="20000">
+                                          <p:val>
+                                            <p:fltVal val="0"/>
+                                          </p:val>
+                                        </p:tav>
+                                        <p:tav tm="25000">
+                                          <p:val>
+                                            <p:strVal val="-0.38*ppt_w"/>
+                                          </p:val>
+                                        </p:tav>
+                                        <p:tav tm="30000">
+                                          <p:val>
+                                            <p:strVal val="-0.71*ppt_w"/>
+                                          </p:val>
+                                        </p:tav>
+                                        <p:tav tm="35000">
+                                          <p:val>
+                                            <p:strVal val="-0.92*ppt_w"/>
+                                          </p:val>
+                                        </p:tav>
+                                        <p:tav tm="40000">
+                                          <p:val>
+                                            <p:strVal val="-ppt_w"/>
+                                          </p:val>
+                                        </p:tav>
+                                        <p:tav tm="45000">
+                                          <p:val>
+                                            <p:strVal val="-0.92*ppt_w"/>
+                                          </p:val>
+                                        </p:tav>
+                                        <p:tav tm="50000">
+                                          <p:val>
+                                            <p:strVal val="-0.71*ppt_w"/>
+                                          </p:val>
+                                        </p:tav>
+                                        <p:tav tm="55000">
+                                          <p:val>
+                                            <p:strVal val="-0.38*ppt_w"/>
+                                          </p:val>
+                                        </p:tav>
+                                        <p:tav tm="60000">
+                                          <p:val>
+                                            <p:fltVal val="0"/>
+                                          </p:val>
+                                        </p:tav>
+                                        <p:tav tm="65000">
+                                          <p:val>
+                                            <p:strVal val="0.38*ppt_w"/>
+                                          </p:val>
+                                        </p:tav>
+                                        <p:tav tm="70000">
+                                          <p:val>
+                                            <p:strVal val="0.71*ppt_w"/>
+                                          </p:val>
+                                        </p:tav>
+                                        <p:tav tm="75000">
+                                          <p:val>
+                                            <p:strVal val="0.92*ppt_w"/>
+                                          </p:val>
+                                        </p:tav>
+                                        <p:tav tm="80000">
+                                          <p:val>
+                                            <p:strVal val="ppt_w"/>
+                                          </p:val>
+                                        </p:tav>
+                                        <p:tav tm="85000">
+                                          <p:val>
+                                            <p:strVal val="0.92*ppt_w"/>
+                                          </p:val>
+                                        </p:tav>
+                                        <p:tav tm="90000">
+                                          <p:val>
+                                            <p:strVal val="0.71*ppt_w"/>
+                                          </p:val>
+                                        </p:tav>
+                                        <p:tav tm="95000">
+                                          <p:val>
+                                            <p:strVal val="0.38*ppt_w"/>
+                                          </p:val>
+                                        </p:tav>
+                                        <p:tav tm="100000">
+                                          <p:val>
+                                            <p:fltVal val="0"/>
+                                          </p:val>
+                                        </p:tav>
+                                      </p:tavLst>
+                                    </p:anim>
+                                    <p:anim calcmode="lin" valueType="num">
+                                      <p:cBhvr>
+                                        <p:cTn id="65" dur="2000"/>
+                                        <p:tgtEl>
+                                          <p:spTgt spid="20"/>
+                                        </p:tgtEl>
+                                        <p:attrNameLst>
+                                          <p:attrName>ppt_h</p:attrName>
+                                        </p:attrNameLst>
+                                      </p:cBhvr>
+                                      <p:tavLst>
+                                        <p:tav tm="0">
+                                          <p:val>
+                                            <p:strVal val="ppt_h"/>
+                                          </p:val>
+                                        </p:tav>
+                                        <p:tav tm="100000">
+                                          <p:val>
+                                            <p:strVal val="ppt_h"/>
+                                          </p:val>
+                                        </p:tav>
+                                      </p:tavLst>
+                                    </p:anim>
+                                    <p:set>
+                                      <p:cBhvr>
+                                        <p:cTn id="66" dur="1" fill="hold">
+                                          <p:stCondLst>
+                                            <p:cond delay="1999"/>
+                                          </p:stCondLst>
+                                        </p:cTn>
+                                        <p:tgtEl>
+                                          <p:spTgt spid="20"/>
+                                        </p:tgtEl>
+                                        <p:attrNameLst>
+                                          <p:attrName>style.visibility</p:attrName>
+                                        </p:attrNameLst>
+                                      </p:cBhvr>
+                                      <p:to>
+                                        <p:strVal val="hidden"/>
+                                      </p:to>
+                                    </p:set>
+                                  </p:childTnLst>
+                                </p:cTn>
+                              </p:par>
+                            </p:childTnLst>
+                          </p:cTn>
+                        </p:par>
+                        <p:par>
+                          <p:cTn id="67" fill="hold">
+                            <p:stCondLst>
+                              <p:cond delay="3000"/>
+                            </p:stCondLst>
+                            <p:childTnLst>
+                              <p:par>
+                                <p:cTn id="68" presetID="45" presetClass="entr" presetSubtype="0" fill="hold" nodeType="afterEffect">
+                                  <p:stCondLst>
+                                    <p:cond delay="0"/>
+                                  </p:stCondLst>
+                                  <p:childTnLst>
+                                    <p:set>
+                                      <p:cBhvr>
+                                        <p:cTn id="69" dur="1" fill="hold">
+                                          <p:stCondLst>
+                                            <p:cond delay="0"/>
+                                          </p:stCondLst>
+                                        </p:cTn>
+                                        <p:tgtEl>
+                                          <p:spTgt spid="27"/>
+                                        </p:tgtEl>
+                                        <p:attrNameLst>
+                                          <p:attrName>style.visibility</p:attrName>
+                                        </p:attrNameLst>
+                                      </p:cBhvr>
+                                      <p:to>
+                                        <p:strVal val="visible"/>
+                                      </p:to>
+                                    </p:set>
+                                    <p:animEffect transition="in" filter="fade">
+                                      <p:cBhvr>
+                                        <p:cTn id="70" dur="2000"/>
+                                        <p:tgtEl>
+                                          <p:spTgt spid="27"/>
+                                        </p:tgtEl>
+                                      </p:cBhvr>
+                                    </p:animEffect>
+                                    <p:anim calcmode="lin" valueType="num">
+                                      <p:cBhvr>
+                                        <p:cTn id="71" dur="2000" fill="hold"/>
+                                        <p:tgtEl>
+                                          <p:spTgt spid="27"/>
                                         </p:tgtEl>
                                         <p:attrNameLst>
                                           <p:attrName>ppt_w</p:attrName>
@@ -26831,9 +28532,9 @@
                                     </p:anim>
                                     <p:anim calcmode="lin" valueType="num">
                                       <p:cBhvr>
-                                        <p:cTn id="25" dur="2000" fill="hold"/>
-                                        <p:tgtEl>
-                                          <p:spTgt spid="6"/>
+                                        <p:cTn id="72" dur="2000" fill="hold"/>
+                                        <p:tgtEl>
+                                          <p:spTgt spid="27"/>
                                         </p:tgtEl>
                                         <p:attrNameLst>
                                           <p:attrName>ppt_h</p:attrName>
@@ -26855,21 +28556,164 @@
                                   </p:childTnLst>
                                 </p:cTn>
                               </p:par>
+                            </p:childTnLst>
+                          </p:cTn>
+                        </p:par>
+                        <p:par>
+                          <p:cTn id="73" fill="hold">
+                            <p:stCondLst>
+                              <p:cond delay="5000"/>
+                            </p:stCondLst>
+                            <p:childTnLst>
                               <p:par>
-                                <p:cTn id="26" presetID="26" presetClass="entr" presetSubtype="0" fill="hold" grpId="0" nodeType="withEffect">
+                                <p:cTn id="74" presetID="22" presetClass="exit" presetSubtype="4" fill="hold" grpId="1" nodeType="afterEffect">
                                   <p:stCondLst>
-                                    <p:cond delay="500"/>
+                                    <p:cond delay="0"/>
+                                  </p:stCondLst>
+                                  <p:childTnLst>
+                                    <p:animEffect transition="out" filter="wipe(down)">
+                                      <p:cBhvr>
+                                        <p:cTn id="75" dur="500"/>
+                                        <p:tgtEl>
+                                          <p:spTgt spid="21"/>
+                                        </p:tgtEl>
+                                      </p:cBhvr>
+                                    </p:animEffect>
+                                    <p:set>
+                                      <p:cBhvr>
+                                        <p:cTn id="76" dur="1" fill="hold">
+                                          <p:stCondLst>
+                                            <p:cond delay="499"/>
+                                          </p:stCondLst>
+                                        </p:cTn>
+                                        <p:tgtEl>
+                                          <p:spTgt spid="21"/>
+                                        </p:tgtEl>
+                                        <p:attrNameLst>
+                                          <p:attrName>style.visibility</p:attrName>
+                                        </p:attrNameLst>
+                                      </p:cBhvr>
+                                      <p:to>
+                                        <p:strVal val="hidden"/>
+                                      </p:to>
+                                    </p:set>
+                                  </p:childTnLst>
+                                </p:cTn>
+                              </p:par>
+                            </p:childTnLst>
+                          </p:cTn>
+                        </p:par>
+                        <p:par>
+                          <p:cTn id="77" fill="hold">
+                            <p:stCondLst>
+                              <p:cond delay="5500"/>
+                            </p:stCondLst>
+                            <p:childTnLst>
+                              <p:par>
+                                <p:cTn id="78" presetID="42" presetClass="exit" presetSubtype="0" fill="hold" nodeType="afterEffect">
+                                  <p:stCondLst>
+                                    <p:cond delay="0"/>
+                                  </p:stCondLst>
+                                  <p:childTnLst>
+                                    <p:animEffect transition="out" filter="fade">
+                                      <p:cBhvr>
+                                        <p:cTn id="79" dur="1000"/>
+                                        <p:tgtEl>
+                                          <p:spTgt spid="23"/>
+                                        </p:tgtEl>
+                                      </p:cBhvr>
+                                    </p:animEffect>
+                                    <p:anim calcmode="lin" valueType="num">
+                                      <p:cBhvr>
+                                        <p:cTn id="80" dur="1000"/>
+                                        <p:tgtEl>
+                                          <p:spTgt spid="23"/>
+                                        </p:tgtEl>
+                                        <p:attrNameLst>
+                                          <p:attrName>ppt_x</p:attrName>
+                                        </p:attrNameLst>
+                                      </p:cBhvr>
+                                      <p:tavLst>
+                                        <p:tav tm="0">
+                                          <p:val>
+                                            <p:strVal val="ppt_x"/>
+                                          </p:val>
+                                        </p:tav>
+                                        <p:tav tm="100000">
+                                          <p:val>
+                                            <p:strVal val="ppt_x"/>
+                                          </p:val>
+                                        </p:tav>
+                                      </p:tavLst>
+                                    </p:anim>
+                                    <p:anim calcmode="lin" valueType="num">
+                                      <p:cBhvr>
+                                        <p:cTn id="81" dur="1000"/>
+                                        <p:tgtEl>
+                                          <p:spTgt spid="23"/>
+                                        </p:tgtEl>
+                                        <p:attrNameLst>
+                                          <p:attrName>ppt_y</p:attrName>
+                                        </p:attrNameLst>
+                                      </p:cBhvr>
+                                      <p:tavLst>
+                                        <p:tav tm="0">
+                                          <p:val>
+                                            <p:strVal val="ppt_y"/>
+                                          </p:val>
+                                        </p:tav>
+                                        <p:tav tm="100000">
+                                          <p:val>
+                                            <p:strVal val="ppt_y+.1"/>
+                                          </p:val>
+                                        </p:tav>
+                                      </p:tavLst>
+                                    </p:anim>
+                                    <p:set>
+                                      <p:cBhvr>
+                                        <p:cTn id="82" dur="1" fill="hold">
+                                          <p:stCondLst>
+                                            <p:cond delay="999"/>
+                                          </p:stCondLst>
+                                        </p:cTn>
+                                        <p:tgtEl>
+                                          <p:spTgt spid="23"/>
+                                        </p:tgtEl>
+                                        <p:attrNameLst>
+                                          <p:attrName>style.visibility</p:attrName>
+                                        </p:attrNameLst>
+                                      </p:cBhvr>
+                                      <p:to>
+                                        <p:strVal val="hidden"/>
+                                      </p:to>
+                                    </p:set>
+                                  </p:childTnLst>
+                                </p:cTn>
+                              </p:par>
+                            </p:childTnLst>
+                          </p:cTn>
+                        </p:par>
+                        <p:par>
+                          <p:cTn id="83" fill="hold">
+                            <p:stCondLst>
+                              <p:cond delay="6500"/>
+                            </p:stCondLst>
+                            <p:childTnLst>
+                              <p:par>
+                                <p:cTn id="84" presetID="10" presetClass="entr" presetSubtype="0" fill="hold" grpId="0" nodeType="afterEffect">
+                                  <p:stCondLst>
+                                    <p:cond delay="0"/>
                                   </p:stCondLst>
                                   <p:childTnLst>
                                     <p:set>
                                       <p:cBhvr>
-                                        <p:cTn id="27" dur="1" fill="hold">
+                                        <p:cTn id="85" dur="1" fill="hold">
                                           <p:stCondLst>
                                             <p:cond delay="0"/>
                                           </p:stCondLst>
                                         </p:cTn>
                                         <p:tgtEl>
-                                          <p:spTgt spid="9"/>
+                                          <p:spTgt spid="29"/>
                                         </p:tgtEl>
                                         <p:attrNameLst>
                                           <p:attrName>style.visibility</p:attrName>
@@ -26879,27 +28723,63 @@
                                         <p:strVal val="visible"/>
                                       </p:to>
                                     </p:set>
-                                    <p:animEffect transition="in" filter="wipe(down)">
+                                    <p:animEffect transition="in" filter="fade">
                                       <p:cBhvr>
-                                        <p:cTn id="28" dur="580">
+                                        <p:cTn id="86" dur="500"/>
+                                        <p:tgtEl>
+                                          <p:spTgt spid="29"/>
+                                        </p:tgtEl>
+                                      </p:cBhvr>
+                                    </p:animEffect>
+                                  </p:childTnLst>
+                                </p:cTn>
+                              </p:par>
+                            </p:childTnLst>
+                          </p:cTn>
+                        </p:par>
+                        <p:par>
+                          <p:cTn id="87" fill="hold">
+                            <p:stCondLst>
+                              <p:cond delay="7000"/>
+                            </p:stCondLst>
+                            <p:childTnLst>
+                              <p:par>
+                                <p:cTn id="88" presetID="42" presetClass="entr" presetSubtype="0" fill="hold" nodeType="afterEffect">
+                                  <p:stCondLst>
+                                    <p:cond delay="0"/>
+                                  </p:stCondLst>
+                                  <p:childTnLst>
+                                    <p:set>
+                                      <p:cBhvr>
+                                        <p:cTn id="89" dur="1" fill="hold">
                                           <p:stCondLst>
                                             <p:cond delay="0"/>
                                           </p:stCondLst>
                                         </p:cTn>
                                         <p:tgtEl>
-                                          <p:spTgt spid="9"/>
+                                          <p:spTgt spid="28"/>
+                                        </p:tgtEl>
+                                        <p:attrNameLst>
+                                          <p:attrName>style.visibility</p:attrName>
+                                        </p:attrNameLst>
+                                      </p:cBhvr>
+                                      <p:to>
+                                        <p:strVal val="visible"/>
+                                      </p:to>
+                                    </p:set>
+                                    <p:animEffect transition="in" filter="fade">
+                                      <p:cBhvr>
+                                        <p:cTn id="90" dur="1000"/>
+                                        <p:tgtEl>
+                                          <p:spTgt spid="28"/>
                                         </p:tgtEl>
                                       </p:cBhvr>
                                     </p:animEffect>
                                     <p:anim calcmode="lin" valueType="num">
                                       <p:cBhvr>
-                                        <p:cTn id="29" dur="1822" tmFilter="0,0; 0.14,0.36; 0.43,0.73; 0.71,0.91; 1.0,1.0">
-                                          <p:stCondLst>
-                                            <p:cond delay="0"/>
-                                          </p:stCondLst>
-                                        </p:cTn>
-                                        <p:tgtEl>
-                                          <p:spTgt spid="9"/>
+                                        <p:cTn id="91" dur="1000" fill="hold"/>
+                                        <p:tgtEl>
+                                          <p:spTgt spid="28"/>
                                         </p:tgtEl>
                                         <p:attrNameLst>
                                           <p:attrName>ppt_x</p:attrName>
@@ -26908,7 +28788,7 @@
                                       <p:tavLst>
                                         <p:tav tm="0">
                                           <p:val>
-                                            <p:strVal val="#ppt_x-0.25"/>
+                                            <p:strVal val="#ppt_x"/>
                                           </p:val>
                                         </p:tav>
                                         <p:tav tm="100000">
@@ -26920,216 +28800,27 @@
                                     </p:anim>
                                     <p:anim calcmode="lin" valueType="num">
                                       <p:cBhvr>
-                                        <p:cTn id="30" dur="664" tmFilter="0.0,0.0; 0.25,0.07; 0.50,0.2; 0.75,0.467; 1.0,1.0">
-                                          <p:stCondLst>
-                                            <p:cond delay="0"/>
-                                          </p:stCondLst>
-                                        </p:cTn>
-                                        <p:tgtEl>
-                                          <p:spTgt spid="9"/>
+                                        <p:cTn id="92" dur="1000" fill="hold"/>
+                                        <p:tgtEl>
+                                          <p:spTgt spid="28"/>
                                         </p:tgtEl>
                                         <p:attrNameLst>
                                           <p:attrName>ppt_y</p:attrName>
                                         </p:attrNameLst>
                                       </p:cBhvr>
                                       <p:tavLst>
-                                        <p:tav tm="0" fmla="#ppt_y-sin(pi*$)/3">
+                                        <p:tav tm="0">
                                           <p:val>
-                                            <p:fltVal val="0.5"/>
+                                            <p:strVal val="#ppt_y+.1"/>
                                           </p:val>
                                         </p:tav>
                                         <p:tav tm="100000">
                                           <p:val>
-                                            <p:fltVal val="1"/>
+                                            <p:strVal val="#ppt_y"/>
                                           </p:val>
                                         </p:tav>
                                       </p:tavLst>
                                     </p:anim>
-                                    <p:anim calcmode="lin" valueType="num">
-                                      <p:cBhvr>
-                                        <p:cTn id="31" dur="664" tmFilter="0, 0; 0.125,0.2665; 0.25,0.4; 0.375,0.465; 0.5,0.5;  0.625,0.535; 0.75,0.6; 0.875,0.7335; 1,1">
-                                          <p:stCondLst>
-                                            <p:cond delay="664"/>
-                                          </p:stCondLst>
-                                        </p:cTn>
-                                        <p:tgtEl>
-                                          <p:spTgt spid="9"/>
-                                        </p:tgtEl>
-                                        <p:attrNameLst>
-                                          <p:attrName>ppt_y</p:attrName>
-                                        </p:attrNameLst>
-                                      </p:cBhvr>
-                                      <p:tavLst>
-                                        <p:tav tm="0" fmla="#ppt_y-sin(pi*$)/9">
-                                          <p:val>
-                                            <p:fltVal val="0"/>
-                                          </p:val>
-                                        </p:tav>
-                                        <p:tav tm="100000">
-                                          <p:val>
-                                            <p:fltVal val="1"/>
-                                          </p:val>
-                                        </p:tav>
-                                      </p:tavLst>
-                                    </p:anim>
-                                    <p:anim calcmode="lin" valueType="num">
-                                      <p:cBhvr>
-                                        <p:cTn id="32" dur="332" tmFilter="0, 0; 0.125,0.2665; 0.25,0.4; 0.375,0.465; 0.5,0.5;  0.625,0.535; 0.75,0.6; 0.875,0.7335; 1,1">
-                                          <p:stCondLst>
-                                            <p:cond delay="1324"/>
-                                          </p:stCondLst>
-                                        </p:cTn>
-                                        <p:tgtEl>
-                                          <p:spTgt spid="9"/>
-                                        </p:tgtEl>
-                                        <p:attrNameLst>
-                                          <p:attrName>ppt_y</p:attrName>
-                                        </p:attrNameLst>
-                                      </p:cBhvr>
-                                      <p:tavLst>
-                                        <p:tav tm="0" fmla="#ppt_y-sin(pi*$)/27">
-                                          <p:val>
-                                            <p:fltVal val="0"/>
-                                          </p:val>
-                                        </p:tav>
-                                        <p:tav tm="100000">
-                                          <p:val>
-                                            <p:fltVal val="1"/>
-                                          </p:val>
-                                        </p:tav>
-                                      </p:tavLst>
-                                    </p:anim>
-                                    <p:anim calcmode="lin" valueType="num">
-                                      <p:cBhvr>
-                                        <p:cTn id="33" dur="164" tmFilter="0, 0; 0.125,0.2665; 0.25,0.4; 0.375,0.465; 0.5,0.5;  0.625,0.535; 0.75,0.6; 0.875,0.7335; 1,1">
-                                          <p:stCondLst>
-                                            <p:cond delay="1656"/>
-                                          </p:stCondLst>
-                                        </p:cTn>
-                                        <p:tgtEl>
-                                          <p:spTgt spid="9"/>
-                                        </p:tgtEl>
-                                        <p:attrNameLst>
-                                          <p:attrName>ppt_y</p:attrName>
-                                        </p:attrNameLst>
-                                      </p:cBhvr>
-                                      <p:tavLst>
-                                        <p:tav tm="0" fmla="#ppt_y-sin(pi*$)/81">
-                                          <p:val>
-                                            <p:fltVal val="0"/>
-                                          </p:val>
-                                        </p:tav>
-                                        <p:tav tm="100000">
-                                          <p:val>
-                                            <p:fltVal val="1"/>
-                                          </p:val>
-                                        </p:tav>
-                                      </p:tavLst>
-                                    </p:anim>
-                                    <p:animScale>
-                                      <p:cBhvr>
-                                        <p:cTn id="34" dur="26">
-                                          <p:stCondLst>
-                                            <p:cond delay="650"/>
-                                          </p:stCondLst>
-                                        </p:cTn>
-                                        <p:tgtEl>
-                                          <p:spTgt spid="9"/>
-                                        </p:tgtEl>
-                                      </p:cBhvr>
-                                      <p:to x="100000" y="60000"/>
-                                    </p:animScale>
-                                    <p:animScale>
-                                      <p:cBhvr>
-                                        <p:cTn id="35" dur="166" decel="50000">
-                                          <p:stCondLst>
-                                            <p:cond delay="676"/>
-                                          </p:stCondLst>
-                                        </p:cTn>
-                                        <p:tgtEl>
-                                          <p:spTgt spid="9"/>
-                                        </p:tgtEl>
-                                      </p:cBhvr>
-                                      <p:to x="100000" y="100000"/>
-                                    </p:animScale>
-                                    <p:animScale>
-                                      <p:cBhvr>
-                                        <p:cTn id="36" dur="26">
-                                          <p:stCondLst>
-                                            <p:cond delay="1312"/>
-                                          </p:stCondLst>
-                                        </p:cTn>
-                                        <p:tgtEl>
-                                          <p:spTgt spid="9"/>
-                                        </p:tgtEl>
-                                      </p:cBhvr>
-                                      <p:to x="100000" y="80000"/>
-                                    </p:animScale>
-                                    <p:animScale>
-                                      <p:cBhvr>
-                                        <p:cTn id="37" dur="166" decel="50000">
-                                          <p:stCondLst>
-                                            <p:cond delay="1338"/>
-                                          </p:stCondLst>
-                                        </p:cTn>
-                                        <p:tgtEl>
-                                          <p:spTgt spid="9"/>
-                                        </p:tgtEl>
-                                      </p:cBhvr>
-                                      <p:to x="100000" y="100000"/>
-                                    </p:animScale>
-                                    <p:animScale>
-                                      <p:cBhvr>
-                                        <p:cTn id="38" dur="26">
-                                          <p:stCondLst>
-                                            <p:cond delay="1642"/>
-                                          </p:stCondLst>
-                                        </p:cTn>
-                                        <p:tgtEl>
-                                          <p:spTgt spid="9"/>
-                                        </p:tgtEl>
-                                      </p:cBhvr>
-                                      <p:to x="100000" y="90000"/>
-                                    </p:animScale>
-                                    <p:animScale>
-                                      <p:cBhvr>
-                                        <p:cTn id="39" dur="166" decel="50000">
-                                          <p:stCondLst>
-                                            <p:cond delay="1668"/>
-                                          </p:stCondLst>
-                                        </p:cTn>
-                                        <p:tgtEl>
-                                          <p:spTgt spid="9"/>
-                                        </p:tgtEl>
-                                      </p:cBhvr>
-                                      <p:to x="100000" y="100000"/>
-                                    </p:animScale>
-                                    <p:animScale>
-                                      <p:cBhvr>
-                                        <p:cTn id="40" dur="26">
-                                          <p:stCondLst>
-                                            <p:cond delay="1808"/>
-                                          </p:stCondLst>
-                                        </p:cTn>
-                                        <p:tgtEl>
-                                          <p:spTgt spid="9"/>
-                                        </p:tgtEl>
-                                      </p:cBhvr>
-                                      <p:to x="100000" y="95000"/>
-                                    </p:animScale>
-                                    <p:animScale>
-                                      <p:cBhvr>
-                                        <p:cTn id="41" dur="166" decel="50000">
-                                          <p:stCondLst>
-                                            <p:cond delay="1834"/>
-                                          </p:stCondLst>
-                                        </p:cTn>
-                                        <p:tgtEl>
-                                          <p:spTgt spid="9"/>
-                                        </p:tgtEl>
-                                      </p:cBhvr>
-                                      <p:to x="100000" y="100000"/>
-                                    </p:animScale>
                                   </p:childTnLst>
                                 </p:cTn>
                               </p:par>
@@ -27162,10 +28853,546 @@
     </p:tnLst>
     <p:bldLst>
       <p:bldP spid="3" grpId="0" build="p"/>
+      <p:bldP spid="12" grpId="0"/>
+      <p:bldP spid="12" grpId="1"/>
+      <p:bldP spid="18" grpId="0"/>
+      <p:bldP spid="18" grpId="1"/>
+      <p:bldP spid="21" grpId="0"/>
+      <p:bldP spid="21" grpId="1"/>
+      <p:bldP spid="26" grpId="0"/>
+      <p:bldP spid="29" grpId="0"/>
+    </p:bldLst>
+  </p:timing>
+</p:sld>
+</file>
+
+<file path=ppt/slides/slide9.xml><?xml version="1.0" encoding="utf-8"?>
+<p:sld xmlns:a="http://schemas.openxmlformats.org/drawingml/2006/main" xmlns:r="http://schemas.openxmlformats.org/officeDocument/2006/relationships" xmlns:p="http://schemas.openxmlformats.org/presentationml/2006/main">
+  <p:cSld>
+    <p:spTree>
+      <p:nvGrpSpPr>
+        <p:cNvPr id="1" name=""/>
+        <p:cNvGrpSpPr/>
+        <p:nvPr/>
+      </p:nvGrpSpPr>
+      <p:grpSpPr>
+        <a:xfrm>
+          <a:off x="0" y="0"/>
+          <a:ext cx="0" cy="0"/>
+          <a:chOff x="0" y="0"/>
+          <a:chExt cx="0" cy="0"/>
+        </a:xfrm>
+      </p:grpSpPr>
+      <p:sp>
+        <p:nvSpPr>
+          <p:cNvPr id="2" name="Title 1"/>
+          <p:cNvSpPr>
+            <a:spLocks noGrp="1"/>
+          </p:cNvSpPr>
+          <p:nvPr>
+            <p:ph type="title"/>
+          </p:nvPr>
+        </p:nvSpPr>
+        <p:spPr>
+          <a:xfrm>
+            <a:off x="1141413" y="618518"/>
+            <a:ext cx="9905998" cy="689287"/>
+          </a:xfrm>
+        </p:spPr>
+        <p:txBody>
+          <a:bodyPr/>
+          <a:lstStyle/>
+          <a:p>
+            <a:r>
+              <a:rPr lang="en-US" dirty="0"/>
+              <a:t>Concepts one step ahead</a:t>
+            </a:r>
+            <a:endParaRPr lang="he-IL" dirty="0"/>
+          </a:p>
+        </p:txBody>
+      </p:sp>
+      <p:sp>
+        <p:nvSpPr>
+          <p:cNvPr id="4" name="TextBox 3"/>
+          <p:cNvSpPr txBox="1"/>
+          <p:nvPr/>
+        </p:nvSpPr>
+        <p:spPr>
+          <a:xfrm>
+            <a:off x="1141413" y="1318438"/>
+            <a:ext cx="3727302" cy="461665"/>
+          </a:xfrm>
+          <a:prstGeom prst="rect">
+            <a:avLst/>
+          </a:prstGeom>
+          <a:noFill/>
+        </p:spPr>
+        <p:txBody>
+          <a:bodyPr wrap="none" rtlCol="1">
+            <a:spAutoFit/>
+          </a:bodyPr>
+          <a:lstStyle/>
+          <a:p>
+            <a:r>
+              <a:rPr lang="en-US" sz="2400" dirty="0"/>
+              <a:t>Interface Without Inheritance</a:t>
+            </a:r>
+            <a:endParaRPr lang="he-IL" sz="2400" dirty="0"/>
+          </a:p>
+        </p:txBody>
+      </p:sp>
+      <p:sp>
+        <p:nvSpPr>
+          <p:cNvPr id="5" name="TextBox 4"/>
+          <p:cNvSpPr txBox="1"/>
+          <p:nvPr/>
+        </p:nvSpPr>
+        <p:spPr>
+          <a:xfrm>
+            <a:off x="1141413" y="1780103"/>
+            <a:ext cx="10783016" cy="646331"/>
+          </a:xfrm>
+          <a:prstGeom prst="rect">
+            <a:avLst/>
+          </a:prstGeom>
+          <a:noFill/>
+        </p:spPr>
+        <p:txBody>
+          <a:bodyPr wrap="none" rtlCol="1">
+            <a:spAutoFit/>
+          </a:bodyPr>
+          <a:lstStyle/>
+          <a:p>
+            <a:r>
+              <a:rPr lang="en-US" dirty="0"/>
+              <a:t>Inheritance allows us to apply interfaces to different classes in order to allow a common functionality between them.</a:t>
+            </a:r>
+          </a:p>
+          <a:p>
+            <a:r>
+              <a:rPr lang="en-US" dirty="0"/>
+              <a:t>Concepts helps us to avoid unnecessary inheritance while keeping the common functionality:</a:t>
+            </a:r>
+            <a:endParaRPr lang="he-IL" dirty="0"/>
+          </a:p>
+        </p:txBody>
+      </p:sp>
+      <p:sp>
+        <p:nvSpPr>
+          <p:cNvPr id="9" name="TextBox 8"/>
+          <p:cNvSpPr txBox="1"/>
+          <p:nvPr/>
+        </p:nvSpPr>
+        <p:spPr>
+          <a:xfrm>
+            <a:off x="1141413" y="5007709"/>
+            <a:ext cx="5390578" cy="369332"/>
+          </a:xfrm>
+          <a:prstGeom prst="rect">
+            <a:avLst/>
+          </a:prstGeom>
+          <a:noFill/>
+        </p:spPr>
+        <p:txBody>
+          <a:bodyPr wrap="none" rtlCol="1">
+            <a:spAutoFit/>
+          </a:bodyPr>
+          <a:lstStyle/>
+          <a:p>
+            <a:r>
+              <a:rPr lang="en-US" dirty="0"/>
+              <a:t>You can also apply concept restrictions to auto variables:</a:t>
+            </a:r>
+            <a:endParaRPr lang="he-IL" dirty="0"/>
+          </a:p>
+        </p:txBody>
+      </p:sp>
+      <p:pic>
+        <p:nvPicPr>
+          <p:cNvPr id="11" name="Picture 10"/>
+          <p:cNvPicPr>
+            <a:picLocks noChangeAspect="1"/>
+          </p:cNvPicPr>
+          <p:nvPr/>
+        </p:nvPicPr>
+        <p:blipFill>
+          <a:blip r:embed="rId2"/>
+          <a:stretch>
+            <a:fillRect/>
+          </a:stretch>
+        </p:blipFill>
+        <p:spPr>
+          <a:xfrm>
+            <a:off x="1234927" y="5377041"/>
+            <a:ext cx="2076450" cy="447675"/>
+          </a:xfrm>
+          <a:prstGeom prst="rect">
+            <a:avLst/>
+          </a:prstGeom>
+        </p:spPr>
+      </p:pic>
+      <p:pic>
+        <p:nvPicPr>
+          <p:cNvPr id="13" name="Picture 12"/>
+          <p:cNvPicPr>
+            <a:picLocks noChangeAspect="1"/>
+          </p:cNvPicPr>
+          <p:nvPr/>
+        </p:nvPicPr>
+        <p:blipFill>
+          <a:blip r:embed="rId3"/>
+          <a:stretch>
+            <a:fillRect/>
+          </a:stretch>
+        </p:blipFill>
+        <p:spPr>
+          <a:xfrm>
+            <a:off x="1234927" y="2428232"/>
+            <a:ext cx="7267575" cy="2590800"/>
+          </a:xfrm>
+          <a:prstGeom prst="rect">
+            <a:avLst/>
+          </a:prstGeom>
+        </p:spPr>
+      </p:pic>
+    </p:spTree>
+    <p:extLst>
+      <p:ext uri="{BB962C8B-B14F-4D97-AF65-F5344CB8AC3E}">
+        <p14:creationId xmlns:p14="http://schemas.microsoft.com/office/powerpoint/2010/main" val="2463616285"/>
+      </p:ext>
+    </p:extLst>
+  </p:cSld>
+  <p:clrMapOvr>
+    <a:masterClrMapping/>
+  </p:clrMapOvr>
+  <p:timing>
+    <p:tnLst>
+      <p:par>
+        <p:cTn id="1" dur="indefinite" restart="never" nodeType="tmRoot">
+          <p:childTnLst>
+            <p:seq concurrent="1" nextAc="seek">
+              <p:cTn id="2" dur="indefinite" nodeType="mainSeq">
+                <p:childTnLst>
+                  <p:par>
+                    <p:cTn id="3" fill="hold">
+                      <p:stCondLst>
+                        <p:cond delay="indefinite"/>
+                      </p:stCondLst>
+                      <p:childTnLst>
+                        <p:par>
+                          <p:cTn id="4" fill="hold">
+                            <p:stCondLst>
+                              <p:cond delay="0"/>
+                            </p:stCondLst>
+                            <p:childTnLst>
+                              <p:par>
+                                <p:cTn id="5" presetID="42" presetClass="entr" presetSubtype="0" fill="hold" grpId="0" nodeType="clickEffect">
+                                  <p:stCondLst>
+                                    <p:cond delay="0"/>
+                                  </p:stCondLst>
+                                  <p:childTnLst>
+                                    <p:set>
+                                      <p:cBhvr>
+                                        <p:cTn id="6" dur="1" fill="hold">
+                                          <p:stCondLst>
+                                            <p:cond delay="0"/>
+                                          </p:stCondLst>
+                                        </p:cTn>
+                                        <p:tgtEl>
+                                          <p:spTgt spid="4"/>
+                                        </p:tgtEl>
+                                        <p:attrNameLst>
+                                          <p:attrName>style.visibility</p:attrName>
+                                        </p:attrNameLst>
+                                      </p:cBhvr>
+                                      <p:to>
+                                        <p:strVal val="visible"/>
+                                      </p:to>
+                                    </p:set>
+                                    <p:animEffect transition="in" filter="fade">
+                                      <p:cBhvr>
+                                        <p:cTn id="7" dur="1000"/>
+                                        <p:tgtEl>
+                                          <p:spTgt spid="4"/>
+                                        </p:tgtEl>
+                                      </p:cBhvr>
+                                    </p:animEffect>
+                                    <p:anim calcmode="lin" valueType="num">
+                                      <p:cBhvr>
+                                        <p:cTn id="8" dur="1000" fill="hold"/>
+                                        <p:tgtEl>
+                                          <p:spTgt spid="4"/>
+                                        </p:tgtEl>
+                                        <p:attrNameLst>
+                                          <p:attrName>ppt_x</p:attrName>
+                                        </p:attrNameLst>
+                                      </p:cBhvr>
+                                      <p:tavLst>
+                                        <p:tav tm="0">
+                                          <p:val>
+                                            <p:strVal val="#ppt_x"/>
+                                          </p:val>
+                                        </p:tav>
+                                        <p:tav tm="100000">
+                                          <p:val>
+                                            <p:strVal val="#ppt_x"/>
+                                          </p:val>
+                                        </p:tav>
+                                      </p:tavLst>
+                                    </p:anim>
+                                    <p:anim calcmode="lin" valueType="num">
+                                      <p:cBhvr>
+                                        <p:cTn id="9" dur="1000" fill="hold"/>
+                                        <p:tgtEl>
+                                          <p:spTgt spid="4"/>
+                                        </p:tgtEl>
+                                        <p:attrNameLst>
+                                          <p:attrName>ppt_y</p:attrName>
+                                        </p:attrNameLst>
+                                      </p:cBhvr>
+                                      <p:tavLst>
+                                        <p:tav tm="0">
+                                          <p:val>
+                                            <p:strVal val="#ppt_y+.1"/>
+                                          </p:val>
+                                        </p:tav>
+                                        <p:tav tm="100000">
+                                          <p:val>
+                                            <p:strVal val="#ppt_y"/>
+                                          </p:val>
+                                        </p:tav>
+                                      </p:tavLst>
+                                    </p:anim>
+                                  </p:childTnLst>
+                                </p:cTn>
+                              </p:par>
+                            </p:childTnLst>
+                          </p:cTn>
+                        </p:par>
+                      </p:childTnLst>
+                    </p:cTn>
+                  </p:par>
+                  <p:par>
+                    <p:cTn id="10" fill="hold">
+                      <p:stCondLst>
+                        <p:cond delay="indefinite"/>
+                      </p:stCondLst>
+                      <p:childTnLst>
+                        <p:par>
+                          <p:cTn id="11" fill="hold">
+                            <p:stCondLst>
+                              <p:cond delay="0"/>
+                            </p:stCondLst>
+                            <p:childTnLst>
+                              <p:par>
+                                <p:cTn id="12" presetID="22" presetClass="entr" presetSubtype="8" fill="hold" grpId="0" nodeType="clickEffect">
+                                  <p:stCondLst>
+                                    <p:cond delay="0"/>
+                                  </p:stCondLst>
+                                  <p:iterate type="lt">
+                                    <p:tmPct val="10000"/>
+                                  </p:iterate>
+                                  <p:childTnLst>
+                                    <p:set>
+                                      <p:cBhvr>
+                                        <p:cTn id="13" dur="1" fill="hold">
+                                          <p:stCondLst>
+                                            <p:cond delay="0"/>
+                                          </p:stCondLst>
+                                        </p:cTn>
+                                        <p:tgtEl>
+                                          <p:spTgt spid="5"/>
+                                        </p:tgtEl>
+                                        <p:attrNameLst>
+                                          <p:attrName>style.visibility</p:attrName>
+                                        </p:attrNameLst>
+                                      </p:cBhvr>
+                                      <p:to>
+                                        <p:strVal val="visible"/>
+                                      </p:to>
+                                    </p:set>
+                                    <p:animEffect transition="in" filter="wipe(left)">
+                                      <p:cBhvr>
+                                        <p:cTn id="14" dur="100"/>
+                                        <p:tgtEl>
+                                          <p:spTgt spid="5"/>
+                                        </p:tgtEl>
+                                      </p:cBhvr>
+                                    </p:animEffect>
+                                  </p:childTnLst>
+                                </p:cTn>
+                              </p:par>
+                            </p:childTnLst>
+                          </p:cTn>
+                        </p:par>
+                        <p:par>
+                          <p:cTn id="15" fill="hold">
+                            <p:stCondLst>
+                              <p:cond delay="1880"/>
+                            </p:stCondLst>
+                            <p:childTnLst>
+                              <p:par>
+                                <p:cTn id="16" presetID="14" presetClass="entr" presetSubtype="5" fill="hold" nodeType="afterEffect">
+                                  <p:stCondLst>
+                                    <p:cond delay="0"/>
+                                  </p:stCondLst>
+                                  <p:childTnLst>
+                                    <p:set>
+                                      <p:cBhvr>
+                                        <p:cTn id="17" dur="1" fill="hold">
+                                          <p:stCondLst>
+                                            <p:cond delay="0"/>
+                                          </p:stCondLst>
+                                        </p:cTn>
+                                        <p:tgtEl>
+                                          <p:spTgt spid="13"/>
+                                        </p:tgtEl>
+                                        <p:attrNameLst>
+                                          <p:attrName>style.visibility</p:attrName>
+                                        </p:attrNameLst>
+                                      </p:cBhvr>
+                                      <p:to>
+                                        <p:strVal val="visible"/>
+                                      </p:to>
+                                    </p:set>
+                                    <p:animEffect transition="in" filter="randombar(vertical)">
+                                      <p:cBhvr>
+                                        <p:cTn id="18" dur="500"/>
+                                        <p:tgtEl>
+                                          <p:spTgt spid="13"/>
+                                        </p:tgtEl>
+                                      </p:cBhvr>
+                                    </p:animEffect>
+                                  </p:childTnLst>
+                                </p:cTn>
+                              </p:par>
+                            </p:childTnLst>
+                          </p:cTn>
+                        </p:par>
+                      </p:childTnLst>
+                    </p:cTn>
+                  </p:par>
+                  <p:par>
+                    <p:cTn id="19" fill="hold">
+                      <p:stCondLst>
+                        <p:cond delay="indefinite"/>
+                      </p:stCondLst>
+                      <p:childTnLst>
+                        <p:par>
+                          <p:cTn id="20" fill="hold">
+                            <p:stCondLst>
+                              <p:cond delay="0"/>
+                            </p:stCondLst>
+                            <p:childTnLst>
+                              <p:par>
+                                <p:cTn id="21" presetID="22" presetClass="entr" presetSubtype="8" fill="hold" grpId="0" nodeType="clickEffect">
+                                  <p:stCondLst>
+                                    <p:cond delay="0"/>
+                                  </p:stCondLst>
+                                  <p:childTnLst>
+                                    <p:set>
+                                      <p:cBhvr>
+                                        <p:cTn id="22" dur="1" fill="hold">
+                                          <p:stCondLst>
+                                            <p:cond delay="0"/>
+                                          </p:stCondLst>
+                                        </p:cTn>
+                                        <p:tgtEl>
+                                          <p:spTgt spid="9"/>
+                                        </p:tgtEl>
+                                        <p:attrNameLst>
+                                          <p:attrName>style.visibility</p:attrName>
+                                        </p:attrNameLst>
+                                      </p:cBhvr>
+                                      <p:to>
+                                        <p:strVal val="visible"/>
+                                      </p:to>
+                                    </p:set>
+                                    <p:animEffect transition="in" filter="wipe(left)">
+                                      <p:cBhvr>
+                                        <p:cTn id="23" dur="500"/>
+                                        <p:tgtEl>
+                                          <p:spTgt spid="9"/>
+                                        </p:tgtEl>
+                                      </p:cBhvr>
+                                    </p:animEffect>
+                                  </p:childTnLst>
+                                </p:cTn>
+                              </p:par>
+                            </p:childTnLst>
+                          </p:cTn>
+                        </p:par>
+                        <p:par>
+                          <p:cTn id="24" fill="hold">
+                            <p:stCondLst>
+                              <p:cond delay="500"/>
+                            </p:stCondLst>
+                            <p:childTnLst>
+                              <p:par>
+                                <p:cTn id="25" presetID="21" presetClass="entr" presetSubtype="1" fill="hold" nodeType="afterEffect">
+                                  <p:stCondLst>
+                                    <p:cond delay="0"/>
+                                  </p:stCondLst>
+                                  <p:childTnLst>
+                                    <p:set>
+                                      <p:cBhvr>
+                                        <p:cTn id="26" dur="1" fill="hold">
+                                          <p:stCondLst>
+                                            <p:cond delay="0"/>
+                                          </p:stCondLst>
+                                        </p:cTn>
+                                        <p:tgtEl>
+                                          <p:spTgt spid="11"/>
+                                        </p:tgtEl>
+                                        <p:attrNameLst>
+                                          <p:attrName>style.visibility</p:attrName>
+                                        </p:attrNameLst>
+                                      </p:cBhvr>
+                                      <p:to>
+                                        <p:strVal val="visible"/>
+                                      </p:to>
+                                    </p:set>
+                                    <p:animEffect transition="in" filter="wheel(1)">
+                                      <p:cBhvr>
+                                        <p:cTn id="27" dur="2000"/>
+                                        <p:tgtEl>
+                                          <p:spTgt spid="11"/>
+                                        </p:tgtEl>
+                                      </p:cBhvr>
+                                    </p:animEffect>
+                                  </p:childTnLst>
+                                </p:cTn>
+                              </p:par>
+                            </p:childTnLst>
+                          </p:cTn>
+                        </p:par>
+                      </p:childTnLst>
+                    </p:cTn>
+                  </p:par>
+                </p:childTnLst>
+              </p:cTn>
+              <p:prevCondLst>
+                <p:cond evt="onPrev" delay="0">
+                  <p:tgtEl>
+                    <p:sldTgt/>
+                  </p:tgtEl>
+                </p:cond>
+              </p:prevCondLst>
+              <p:nextCondLst>
+                <p:cond evt="onNext" delay="0">
+                  <p:tgtEl>
+                    <p:sldTgt/>
+                  </p:tgtEl>
+                </p:cond>
+              </p:nextCondLst>
+            </p:seq>
+          </p:childTnLst>
+        </p:cTn>
+      </p:par>
+    </p:tnLst>
+    <p:bldLst>
       <p:bldP spid="4" grpId="0"/>
       <p:bldP spid="5" grpId="0"/>
-      <p:bldP spid="6" grpId="0"/>
-      <p:bldP spid="7" grpId="0"/>
       <p:bldP spid="9" grpId="0"/>
     </p:bldLst>
   </p:timing>

</xml_diff>

<commit_message>
Add (but not finished) constexpr & consteval slide.
</commit_message>
<xml_diff>
--- a/The Compilation Power – C++.pptx
+++ b/The Compilation Power – C++.pptx
@@ -6,10 +6,10 @@
     <p:sldMasterId id="2147483696" r:id="rId2"/>
   </p:sldMasterIdLst>
   <p:notesMasterIdLst>
-    <p:notesMasterId r:id="rId13"/>
+    <p:notesMasterId r:id="rId14"/>
   </p:notesMasterIdLst>
   <p:handoutMasterIdLst>
-    <p:handoutMasterId r:id="rId14"/>
+    <p:handoutMasterId r:id="rId15"/>
   </p:handoutMasterIdLst>
   <p:sldIdLst>
     <p:sldId id="256" r:id="rId3"/>
@@ -19,9 +19,10 @@
     <p:sldId id="261" r:id="rId7"/>
     <p:sldId id="262" r:id="rId8"/>
     <p:sldId id="263" r:id="rId9"/>
-    <p:sldId id="264" r:id="rId10"/>
-    <p:sldId id="265" r:id="rId11"/>
-    <p:sldId id="259" r:id="rId12"/>
+    <p:sldId id="266" r:id="rId10"/>
+    <p:sldId id="264" r:id="rId11"/>
+    <p:sldId id="265" r:id="rId12"/>
+    <p:sldId id="259" r:id="rId13"/>
   </p:sldIdLst>
   <p:sldSz cx="12192000" cy="6858000"/>
   <p:notesSz cx="6858000" cy="9144000"/>
@@ -132,6 +133,7 @@
             <p14:sldId id="261"/>
             <p14:sldId id="262"/>
             <p14:sldId id="263"/>
+            <p14:sldId id="266"/>
             <p14:sldId id="264"/>
             <p14:sldId id="265"/>
             <p14:sldId id="259"/>
@@ -18977,6 +18979,539 @@
             <p:ph type="title"/>
           </p:nvPr>
         </p:nvSpPr>
+        <p:spPr>
+          <a:xfrm>
+            <a:off x="1141413" y="618518"/>
+            <a:ext cx="9905998" cy="689287"/>
+          </a:xfrm>
+        </p:spPr>
+        <p:txBody>
+          <a:bodyPr/>
+          <a:lstStyle/>
+          <a:p>
+            <a:r>
+              <a:rPr lang="en-US" dirty="0"/>
+              <a:t>Concepts one step ahead</a:t>
+            </a:r>
+            <a:endParaRPr lang="he-IL" dirty="0"/>
+          </a:p>
+        </p:txBody>
+      </p:sp>
+      <p:sp>
+        <p:nvSpPr>
+          <p:cNvPr id="4" name="TextBox 3"/>
+          <p:cNvSpPr txBox="1"/>
+          <p:nvPr/>
+        </p:nvSpPr>
+        <p:spPr>
+          <a:xfrm>
+            <a:off x="1141413" y="1318438"/>
+            <a:ext cx="3727302" cy="461665"/>
+          </a:xfrm>
+          <a:prstGeom prst="rect">
+            <a:avLst/>
+          </a:prstGeom>
+          <a:noFill/>
+        </p:spPr>
+        <p:txBody>
+          <a:bodyPr wrap="none" rtlCol="1">
+            <a:spAutoFit/>
+          </a:bodyPr>
+          <a:lstStyle/>
+          <a:p>
+            <a:r>
+              <a:rPr lang="en-US" sz="2400" dirty="0"/>
+              <a:t>Interface Without Inheritance</a:t>
+            </a:r>
+            <a:endParaRPr lang="he-IL" sz="2400" dirty="0"/>
+          </a:p>
+        </p:txBody>
+      </p:sp>
+      <p:sp>
+        <p:nvSpPr>
+          <p:cNvPr id="5" name="TextBox 4"/>
+          <p:cNvSpPr txBox="1"/>
+          <p:nvPr/>
+        </p:nvSpPr>
+        <p:spPr>
+          <a:xfrm>
+            <a:off x="1141413" y="1780103"/>
+            <a:ext cx="10783016" cy="646331"/>
+          </a:xfrm>
+          <a:prstGeom prst="rect">
+            <a:avLst/>
+          </a:prstGeom>
+          <a:noFill/>
+        </p:spPr>
+        <p:txBody>
+          <a:bodyPr wrap="none" rtlCol="1">
+            <a:spAutoFit/>
+          </a:bodyPr>
+          <a:lstStyle/>
+          <a:p>
+            <a:r>
+              <a:rPr lang="en-US" dirty="0"/>
+              <a:t>Inheritance allows us to apply interfaces to different classes in order to allow a common functionality between them.</a:t>
+            </a:r>
+          </a:p>
+          <a:p>
+            <a:r>
+              <a:rPr lang="en-US" dirty="0"/>
+              <a:t>Concepts helps us to avoid unnecessary inheritance while keeping the common functionality:</a:t>
+            </a:r>
+            <a:endParaRPr lang="he-IL" dirty="0"/>
+          </a:p>
+        </p:txBody>
+      </p:sp>
+      <p:sp>
+        <p:nvSpPr>
+          <p:cNvPr id="9" name="TextBox 8"/>
+          <p:cNvSpPr txBox="1"/>
+          <p:nvPr/>
+        </p:nvSpPr>
+        <p:spPr>
+          <a:xfrm>
+            <a:off x="1141413" y="5007709"/>
+            <a:ext cx="5390578" cy="369332"/>
+          </a:xfrm>
+          <a:prstGeom prst="rect">
+            <a:avLst/>
+          </a:prstGeom>
+          <a:noFill/>
+        </p:spPr>
+        <p:txBody>
+          <a:bodyPr wrap="none" rtlCol="1">
+            <a:spAutoFit/>
+          </a:bodyPr>
+          <a:lstStyle/>
+          <a:p>
+            <a:r>
+              <a:rPr lang="en-US" dirty="0"/>
+              <a:t>You can also apply concept restrictions to auto variables:</a:t>
+            </a:r>
+            <a:endParaRPr lang="he-IL" dirty="0"/>
+          </a:p>
+        </p:txBody>
+      </p:sp>
+      <p:pic>
+        <p:nvPicPr>
+          <p:cNvPr id="11" name="Picture 10"/>
+          <p:cNvPicPr>
+            <a:picLocks noChangeAspect="1"/>
+          </p:cNvPicPr>
+          <p:nvPr/>
+        </p:nvPicPr>
+        <p:blipFill>
+          <a:blip r:embed="rId2"/>
+          <a:stretch>
+            <a:fillRect/>
+          </a:stretch>
+        </p:blipFill>
+        <p:spPr>
+          <a:xfrm>
+            <a:off x="1234927" y="5377041"/>
+            <a:ext cx="2076450" cy="447675"/>
+          </a:xfrm>
+          <a:prstGeom prst="rect">
+            <a:avLst/>
+          </a:prstGeom>
+        </p:spPr>
+      </p:pic>
+      <p:pic>
+        <p:nvPicPr>
+          <p:cNvPr id="13" name="Picture 12"/>
+          <p:cNvPicPr>
+            <a:picLocks noChangeAspect="1"/>
+          </p:cNvPicPr>
+          <p:nvPr/>
+        </p:nvPicPr>
+        <p:blipFill>
+          <a:blip r:embed="rId3"/>
+          <a:stretch>
+            <a:fillRect/>
+          </a:stretch>
+        </p:blipFill>
+        <p:spPr>
+          <a:xfrm>
+            <a:off x="1234927" y="2428232"/>
+            <a:ext cx="7267575" cy="2590800"/>
+          </a:xfrm>
+          <a:prstGeom prst="rect">
+            <a:avLst/>
+          </a:prstGeom>
+        </p:spPr>
+      </p:pic>
+    </p:spTree>
+    <p:extLst>
+      <p:ext uri="{BB962C8B-B14F-4D97-AF65-F5344CB8AC3E}">
+        <p14:creationId xmlns:p14="http://schemas.microsoft.com/office/powerpoint/2010/main" val="2463616285"/>
+      </p:ext>
+    </p:extLst>
+  </p:cSld>
+  <p:clrMapOvr>
+    <a:masterClrMapping/>
+  </p:clrMapOvr>
+  <p:timing>
+    <p:tnLst>
+      <p:par>
+        <p:cTn id="1" dur="indefinite" restart="never" nodeType="tmRoot">
+          <p:childTnLst>
+            <p:seq concurrent="1" nextAc="seek">
+              <p:cTn id="2" dur="indefinite" nodeType="mainSeq">
+                <p:childTnLst>
+                  <p:par>
+                    <p:cTn id="3" fill="hold">
+                      <p:stCondLst>
+                        <p:cond delay="indefinite"/>
+                      </p:stCondLst>
+                      <p:childTnLst>
+                        <p:par>
+                          <p:cTn id="4" fill="hold">
+                            <p:stCondLst>
+                              <p:cond delay="0"/>
+                            </p:stCondLst>
+                            <p:childTnLst>
+                              <p:par>
+                                <p:cTn id="5" presetID="42" presetClass="entr" presetSubtype="0" fill="hold" grpId="0" nodeType="clickEffect">
+                                  <p:stCondLst>
+                                    <p:cond delay="0"/>
+                                  </p:stCondLst>
+                                  <p:childTnLst>
+                                    <p:set>
+                                      <p:cBhvr>
+                                        <p:cTn id="6" dur="1" fill="hold">
+                                          <p:stCondLst>
+                                            <p:cond delay="0"/>
+                                          </p:stCondLst>
+                                        </p:cTn>
+                                        <p:tgtEl>
+                                          <p:spTgt spid="4"/>
+                                        </p:tgtEl>
+                                        <p:attrNameLst>
+                                          <p:attrName>style.visibility</p:attrName>
+                                        </p:attrNameLst>
+                                      </p:cBhvr>
+                                      <p:to>
+                                        <p:strVal val="visible"/>
+                                      </p:to>
+                                    </p:set>
+                                    <p:animEffect transition="in" filter="fade">
+                                      <p:cBhvr>
+                                        <p:cTn id="7" dur="1000"/>
+                                        <p:tgtEl>
+                                          <p:spTgt spid="4"/>
+                                        </p:tgtEl>
+                                      </p:cBhvr>
+                                    </p:animEffect>
+                                    <p:anim calcmode="lin" valueType="num">
+                                      <p:cBhvr>
+                                        <p:cTn id="8" dur="1000" fill="hold"/>
+                                        <p:tgtEl>
+                                          <p:spTgt spid="4"/>
+                                        </p:tgtEl>
+                                        <p:attrNameLst>
+                                          <p:attrName>ppt_x</p:attrName>
+                                        </p:attrNameLst>
+                                      </p:cBhvr>
+                                      <p:tavLst>
+                                        <p:tav tm="0">
+                                          <p:val>
+                                            <p:strVal val="#ppt_x"/>
+                                          </p:val>
+                                        </p:tav>
+                                        <p:tav tm="100000">
+                                          <p:val>
+                                            <p:strVal val="#ppt_x"/>
+                                          </p:val>
+                                        </p:tav>
+                                      </p:tavLst>
+                                    </p:anim>
+                                    <p:anim calcmode="lin" valueType="num">
+                                      <p:cBhvr>
+                                        <p:cTn id="9" dur="1000" fill="hold"/>
+                                        <p:tgtEl>
+                                          <p:spTgt spid="4"/>
+                                        </p:tgtEl>
+                                        <p:attrNameLst>
+                                          <p:attrName>ppt_y</p:attrName>
+                                        </p:attrNameLst>
+                                      </p:cBhvr>
+                                      <p:tavLst>
+                                        <p:tav tm="0">
+                                          <p:val>
+                                            <p:strVal val="#ppt_y+.1"/>
+                                          </p:val>
+                                        </p:tav>
+                                        <p:tav tm="100000">
+                                          <p:val>
+                                            <p:strVal val="#ppt_y"/>
+                                          </p:val>
+                                        </p:tav>
+                                      </p:tavLst>
+                                    </p:anim>
+                                  </p:childTnLst>
+                                </p:cTn>
+                              </p:par>
+                            </p:childTnLst>
+                          </p:cTn>
+                        </p:par>
+                      </p:childTnLst>
+                    </p:cTn>
+                  </p:par>
+                  <p:par>
+                    <p:cTn id="10" fill="hold">
+                      <p:stCondLst>
+                        <p:cond delay="indefinite"/>
+                      </p:stCondLst>
+                      <p:childTnLst>
+                        <p:par>
+                          <p:cTn id="11" fill="hold">
+                            <p:stCondLst>
+                              <p:cond delay="0"/>
+                            </p:stCondLst>
+                            <p:childTnLst>
+                              <p:par>
+                                <p:cTn id="12" presetID="22" presetClass="entr" presetSubtype="8" fill="hold" grpId="0" nodeType="clickEffect">
+                                  <p:stCondLst>
+                                    <p:cond delay="0"/>
+                                  </p:stCondLst>
+                                  <p:iterate type="lt">
+                                    <p:tmPct val="10000"/>
+                                  </p:iterate>
+                                  <p:childTnLst>
+                                    <p:set>
+                                      <p:cBhvr>
+                                        <p:cTn id="13" dur="1" fill="hold">
+                                          <p:stCondLst>
+                                            <p:cond delay="0"/>
+                                          </p:stCondLst>
+                                        </p:cTn>
+                                        <p:tgtEl>
+                                          <p:spTgt spid="5"/>
+                                        </p:tgtEl>
+                                        <p:attrNameLst>
+                                          <p:attrName>style.visibility</p:attrName>
+                                        </p:attrNameLst>
+                                      </p:cBhvr>
+                                      <p:to>
+                                        <p:strVal val="visible"/>
+                                      </p:to>
+                                    </p:set>
+                                    <p:animEffect transition="in" filter="wipe(left)">
+                                      <p:cBhvr>
+                                        <p:cTn id="14" dur="100"/>
+                                        <p:tgtEl>
+                                          <p:spTgt spid="5"/>
+                                        </p:tgtEl>
+                                      </p:cBhvr>
+                                    </p:animEffect>
+                                  </p:childTnLst>
+                                </p:cTn>
+                              </p:par>
+                            </p:childTnLst>
+                          </p:cTn>
+                        </p:par>
+                        <p:par>
+                          <p:cTn id="15" fill="hold">
+                            <p:stCondLst>
+                              <p:cond delay="1880"/>
+                            </p:stCondLst>
+                            <p:childTnLst>
+                              <p:par>
+                                <p:cTn id="16" presetID="14" presetClass="entr" presetSubtype="5" fill="hold" nodeType="afterEffect">
+                                  <p:stCondLst>
+                                    <p:cond delay="0"/>
+                                  </p:stCondLst>
+                                  <p:childTnLst>
+                                    <p:set>
+                                      <p:cBhvr>
+                                        <p:cTn id="17" dur="1" fill="hold">
+                                          <p:stCondLst>
+                                            <p:cond delay="0"/>
+                                          </p:stCondLst>
+                                        </p:cTn>
+                                        <p:tgtEl>
+                                          <p:spTgt spid="13"/>
+                                        </p:tgtEl>
+                                        <p:attrNameLst>
+                                          <p:attrName>style.visibility</p:attrName>
+                                        </p:attrNameLst>
+                                      </p:cBhvr>
+                                      <p:to>
+                                        <p:strVal val="visible"/>
+                                      </p:to>
+                                    </p:set>
+                                    <p:animEffect transition="in" filter="randombar(vertical)">
+                                      <p:cBhvr>
+                                        <p:cTn id="18" dur="500"/>
+                                        <p:tgtEl>
+                                          <p:spTgt spid="13"/>
+                                        </p:tgtEl>
+                                      </p:cBhvr>
+                                    </p:animEffect>
+                                  </p:childTnLst>
+                                </p:cTn>
+                              </p:par>
+                            </p:childTnLst>
+                          </p:cTn>
+                        </p:par>
+                      </p:childTnLst>
+                    </p:cTn>
+                  </p:par>
+                  <p:par>
+                    <p:cTn id="19" fill="hold">
+                      <p:stCondLst>
+                        <p:cond delay="indefinite"/>
+                      </p:stCondLst>
+                      <p:childTnLst>
+                        <p:par>
+                          <p:cTn id="20" fill="hold">
+                            <p:stCondLst>
+                              <p:cond delay="0"/>
+                            </p:stCondLst>
+                            <p:childTnLst>
+                              <p:par>
+                                <p:cTn id="21" presetID="22" presetClass="entr" presetSubtype="8" fill="hold" grpId="0" nodeType="clickEffect">
+                                  <p:stCondLst>
+                                    <p:cond delay="0"/>
+                                  </p:stCondLst>
+                                  <p:childTnLst>
+                                    <p:set>
+                                      <p:cBhvr>
+                                        <p:cTn id="22" dur="1" fill="hold">
+                                          <p:stCondLst>
+                                            <p:cond delay="0"/>
+                                          </p:stCondLst>
+                                        </p:cTn>
+                                        <p:tgtEl>
+                                          <p:spTgt spid="9"/>
+                                        </p:tgtEl>
+                                        <p:attrNameLst>
+                                          <p:attrName>style.visibility</p:attrName>
+                                        </p:attrNameLst>
+                                      </p:cBhvr>
+                                      <p:to>
+                                        <p:strVal val="visible"/>
+                                      </p:to>
+                                    </p:set>
+                                    <p:animEffect transition="in" filter="wipe(left)">
+                                      <p:cBhvr>
+                                        <p:cTn id="23" dur="500"/>
+                                        <p:tgtEl>
+                                          <p:spTgt spid="9"/>
+                                        </p:tgtEl>
+                                      </p:cBhvr>
+                                    </p:animEffect>
+                                  </p:childTnLst>
+                                </p:cTn>
+                              </p:par>
+                            </p:childTnLst>
+                          </p:cTn>
+                        </p:par>
+                        <p:par>
+                          <p:cTn id="24" fill="hold">
+                            <p:stCondLst>
+                              <p:cond delay="500"/>
+                            </p:stCondLst>
+                            <p:childTnLst>
+                              <p:par>
+                                <p:cTn id="25" presetID="21" presetClass="entr" presetSubtype="1" fill="hold" nodeType="afterEffect">
+                                  <p:stCondLst>
+                                    <p:cond delay="0"/>
+                                  </p:stCondLst>
+                                  <p:childTnLst>
+                                    <p:set>
+                                      <p:cBhvr>
+                                        <p:cTn id="26" dur="1" fill="hold">
+                                          <p:stCondLst>
+                                            <p:cond delay="0"/>
+                                          </p:stCondLst>
+                                        </p:cTn>
+                                        <p:tgtEl>
+                                          <p:spTgt spid="11"/>
+                                        </p:tgtEl>
+                                        <p:attrNameLst>
+                                          <p:attrName>style.visibility</p:attrName>
+                                        </p:attrNameLst>
+                                      </p:cBhvr>
+                                      <p:to>
+                                        <p:strVal val="visible"/>
+                                      </p:to>
+                                    </p:set>
+                                    <p:animEffect transition="in" filter="wheel(1)">
+                                      <p:cBhvr>
+                                        <p:cTn id="27" dur="2000"/>
+                                        <p:tgtEl>
+                                          <p:spTgt spid="11"/>
+                                        </p:tgtEl>
+                                      </p:cBhvr>
+                                    </p:animEffect>
+                                  </p:childTnLst>
+                                </p:cTn>
+                              </p:par>
+                            </p:childTnLst>
+                          </p:cTn>
+                        </p:par>
+                      </p:childTnLst>
+                    </p:cTn>
+                  </p:par>
+                </p:childTnLst>
+              </p:cTn>
+              <p:prevCondLst>
+                <p:cond evt="onPrev" delay="0">
+                  <p:tgtEl>
+                    <p:sldTgt/>
+                  </p:tgtEl>
+                </p:cond>
+              </p:prevCondLst>
+              <p:nextCondLst>
+                <p:cond evt="onNext" delay="0">
+                  <p:tgtEl>
+                    <p:sldTgt/>
+                  </p:tgtEl>
+                </p:cond>
+              </p:nextCondLst>
+            </p:seq>
+          </p:childTnLst>
+        </p:cTn>
+      </p:par>
+    </p:tnLst>
+    <p:bldLst>
+      <p:bldP spid="4" grpId="0"/>
+      <p:bldP spid="5" grpId="0"/>
+      <p:bldP spid="9" grpId="0"/>
+    </p:bldLst>
+  </p:timing>
+</p:sld>
+</file>
+
+<file path=ppt/slides/slide11.xml><?xml version="1.0" encoding="utf-8"?>
+<p:sld xmlns:a="http://schemas.openxmlformats.org/drawingml/2006/main" xmlns:r="http://schemas.openxmlformats.org/officeDocument/2006/relationships" xmlns:p="http://schemas.openxmlformats.org/presentationml/2006/main">
+  <p:cSld>
+    <p:spTree>
+      <p:nvGrpSpPr>
+        <p:cNvPr id="1" name=""/>
+        <p:cNvGrpSpPr/>
+        <p:nvPr/>
+      </p:nvGrpSpPr>
+      <p:grpSpPr>
+        <a:xfrm>
+          <a:off x="0" y="0"/>
+          <a:ext cx="0" cy="0"/>
+          <a:chOff x="0" y="0"/>
+          <a:chExt cx="0" cy="0"/>
+        </a:xfrm>
+      </p:grpSpPr>
+      <p:sp>
+        <p:nvSpPr>
+          <p:cNvPr id="2" name="Title 1"/>
+          <p:cNvSpPr>
+            <a:spLocks noGrp="1"/>
+          </p:cNvSpPr>
+          <p:nvPr>
+            <p:ph type="title"/>
+          </p:nvPr>
+        </p:nvSpPr>
         <p:spPr/>
         <p:txBody>
           <a:bodyPr/>
@@ -27205,6 +27740,126 @@
         </p:nvSpPr>
         <p:spPr>
           <a:xfrm>
+            <a:off x="1141413" y="618518"/>
+            <a:ext cx="9905998" cy="657389"/>
+          </a:xfrm>
+        </p:spPr>
+        <p:txBody>
+          <a:bodyPr/>
+          <a:lstStyle/>
+          <a:p>
+            <a:r>
+              <a:rPr lang="en-US" dirty="0" err="1"/>
+              <a:t>Constexpr</a:t>
+            </a:r>
+            <a:r>
+              <a:rPr lang="en-US" dirty="0"/>
+              <a:t> &amp; </a:t>
+            </a:r>
+            <a:r>
+              <a:rPr lang="en-US" dirty="0" err="1"/>
+              <a:t>Consteval</a:t>
+            </a:r>
+            <a:endParaRPr lang="he-IL" dirty="0"/>
+          </a:p>
+        </p:txBody>
+      </p:sp>
+      <p:sp>
+        <p:nvSpPr>
+          <p:cNvPr id="4" name="TextBox 3"/>
+          <p:cNvSpPr txBox="1"/>
+          <p:nvPr/>
+        </p:nvSpPr>
+        <p:spPr>
+          <a:xfrm>
+            <a:off x="1275907" y="1562986"/>
+            <a:ext cx="10231968" cy="923330"/>
+          </a:xfrm>
+          <a:prstGeom prst="rect">
+            <a:avLst/>
+          </a:prstGeom>
+          <a:noFill/>
+        </p:spPr>
+        <p:txBody>
+          <a:bodyPr wrap="none" rtlCol="1">
+            <a:spAutoFit/>
+          </a:bodyPr>
+          <a:lstStyle/>
+          <a:p>
+            <a:r>
+              <a:rPr lang="en-US" dirty="0" err="1"/>
+              <a:t>Constexpr</a:t>
+            </a:r>
+            <a:r>
+              <a:rPr lang="en-US" dirty="0"/>
+              <a:t> allows us to create large (possibly) compile time sections which might contain variables, conditions,</a:t>
+            </a:r>
+          </a:p>
+          <a:p>
+            <a:r>
+              <a:rPr lang="en-US" dirty="0"/>
+              <a:t>loops, classes and more! New C++ versions brought new abilities to this keyword, and C++20 brought us</a:t>
+            </a:r>
+          </a:p>
+          <a:p>
+            <a:r>
+              <a:rPr lang="en-US" dirty="0"/>
+              <a:t>for the first time the complete compile-time evaluation keyword: </a:t>
+            </a:r>
+            <a:r>
+              <a:rPr lang="en-US" dirty="0" err="1"/>
+              <a:t>consteval</a:t>
+            </a:r>
+            <a:r>
+              <a:rPr lang="en-US" dirty="0"/>
+              <a:t>.</a:t>
+            </a:r>
+            <a:endParaRPr lang="he-IL" dirty="0"/>
+          </a:p>
+        </p:txBody>
+      </p:sp>
+    </p:spTree>
+    <p:extLst>
+      <p:ext uri="{BB962C8B-B14F-4D97-AF65-F5344CB8AC3E}">
+        <p14:creationId xmlns:p14="http://schemas.microsoft.com/office/powerpoint/2010/main" val="3268483122"/>
+      </p:ext>
+    </p:extLst>
+  </p:cSld>
+  <p:clrMapOvr>
+    <a:masterClrMapping/>
+  </p:clrMapOvr>
+</p:sld>
+</file>
+
+<file path=ppt/slides/slide9.xml><?xml version="1.0" encoding="utf-8"?>
+<p:sld xmlns:a="http://schemas.openxmlformats.org/drawingml/2006/main" xmlns:r="http://schemas.openxmlformats.org/officeDocument/2006/relationships" xmlns:p="http://schemas.openxmlformats.org/presentationml/2006/main">
+  <p:cSld>
+    <p:spTree>
+      <p:nvGrpSpPr>
+        <p:cNvPr id="1" name=""/>
+        <p:cNvGrpSpPr/>
+        <p:nvPr/>
+      </p:nvGrpSpPr>
+      <p:grpSpPr>
+        <a:xfrm>
+          <a:off x="0" y="0"/>
+          <a:ext cx="0" cy="0"/>
+          <a:chOff x="0" y="0"/>
+          <a:chExt cx="0" cy="0"/>
+        </a:xfrm>
+      </p:grpSpPr>
+      <p:sp>
+        <p:nvSpPr>
+          <p:cNvPr id="2" name="Title 1"/>
+          <p:cNvSpPr>
+            <a:spLocks noGrp="1"/>
+          </p:cNvSpPr>
+          <p:nvPr>
+            <p:ph type="title"/>
+          </p:nvPr>
+        </p:nvSpPr>
+        <p:spPr>
+          <a:xfrm>
             <a:off x="1141413" y="639784"/>
             <a:ext cx="9905998" cy="614859"/>
           </a:xfrm>
@@ -28861,539 +29516,6 @@
       <p:bldP spid="21" grpId="1"/>
       <p:bldP spid="26" grpId="0"/>
       <p:bldP spid="29" grpId="0"/>
-    </p:bldLst>
-  </p:timing>
-</p:sld>
-</file>
-
-<file path=ppt/slides/slide9.xml><?xml version="1.0" encoding="utf-8"?>
-<p:sld xmlns:a="http://schemas.openxmlformats.org/drawingml/2006/main" xmlns:r="http://schemas.openxmlformats.org/officeDocument/2006/relationships" xmlns:p="http://schemas.openxmlformats.org/presentationml/2006/main">
-  <p:cSld>
-    <p:spTree>
-      <p:nvGrpSpPr>
-        <p:cNvPr id="1" name=""/>
-        <p:cNvGrpSpPr/>
-        <p:nvPr/>
-      </p:nvGrpSpPr>
-      <p:grpSpPr>
-        <a:xfrm>
-          <a:off x="0" y="0"/>
-          <a:ext cx="0" cy="0"/>
-          <a:chOff x="0" y="0"/>
-          <a:chExt cx="0" cy="0"/>
-        </a:xfrm>
-      </p:grpSpPr>
-      <p:sp>
-        <p:nvSpPr>
-          <p:cNvPr id="2" name="Title 1"/>
-          <p:cNvSpPr>
-            <a:spLocks noGrp="1"/>
-          </p:cNvSpPr>
-          <p:nvPr>
-            <p:ph type="title"/>
-          </p:nvPr>
-        </p:nvSpPr>
-        <p:spPr>
-          <a:xfrm>
-            <a:off x="1141413" y="618518"/>
-            <a:ext cx="9905998" cy="689287"/>
-          </a:xfrm>
-        </p:spPr>
-        <p:txBody>
-          <a:bodyPr/>
-          <a:lstStyle/>
-          <a:p>
-            <a:r>
-              <a:rPr lang="en-US" dirty="0"/>
-              <a:t>Concepts one step ahead</a:t>
-            </a:r>
-            <a:endParaRPr lang="he-IL" dirty="0"/>
-          </a:p>
-        </p:txBody>
-      </p:sp>
-      <p:sp>
-        <p:nvSpPr>
-          <p:cNvPr id="4" name="TextBox 3"/>
-          <p:cNvSpPr txBox="1"/>
-          <p:nvPr/>
-        </p:nvSpPr>
-        <p:spPr>
-          <a:xfrm>
-            <a:off x="1141413" y="1318438"/>
-            <a:ext cx="3727302" cy="461665"/>
-          </a:xfrm>
-          <a:prstGeom prst="rect">
-            <a:avLst/>
-          </a:prstGeom>
-          <a:noFill/>
-        </p:spPr>
-        <p:txBody>
-          <a:bodyPr wrap="none" rtlCol="1">
-            <a:spAutoFit/>
-          </a:bodyPr>
-          <a:lstStyle/>
-          <a:p>
-            <a:r>
-              <a:rPr lang="en-US" sz="2400" dirty="0"/>
-              <a:t>Interface Without Inheritance</a:t>
-            </a:r>
-            <a:endParaRPr lang="he-IL" sz="2400" dirty="0"/>
-          </a:p>
-        </p:txBody>
-      </p:sp>
-      <p:sp>
-        <p:nvSpPr>
-          <p:cNvPr id="5" name="TextBox 4"/>
-          <p:cNvSpPr txBox="1"/>
-          <p:nvPr/>
-        </p:nvSpPr>
-        <p:spPr>
-          <a:xfrm>
-            <a:off x="1141413" y="1780103"/>
-            <a:ext cx="10783016" cy="646331"/>
-          </a:xfrm>
-          <a:prstGeom prst="rect">
-            <a:avLst/>
-          </a:prstGeom>
-          <a:noFill/>
-        </p:spPr>
-        <p:txBody>
-          <a:bodyPr wrap="none" rtlCol="1">
-            <a:spAutoFit/>
-          </a:bodyPr>
-          <a:lstStyle/>
-          <a:p>
-            <a:r>
-              <a:rPr lang="en-US" dirty="0"/>
-              <a:t>Inheritance allows us to apply interfaces to different classes in order to allow a common functionality between them.</a:t>
-            </a:r>
-          </a:p>
-          <a:p>
-            <a:r>
-              <a:rPr lang="en-US" dirty="0"/>
-              <a:t>Concepts helps us to avoid unnecessary inheritance while keeping the common functionality:</a:t>
-            </a:r>
-            <a:endParaRPr lang="he-IL" dirty="0"/>
-          </a:p>
-        </p:txBody>
-      </p:sp>
-      <p:sp>
-        <p:nvSpPr>
-          <p:cNvPr id="9" name="TextBox 8"/>
-          <p:cNvSpPr txBox="1"/>
-          <p:nvPr/>
-        </p:nvSpPr>
-        <p:spPr>
-          <a:xfrm>
-            <a:off x="1141413" y="5007709"/>
-            <a:ext cx="5390578" cy="369332"/>
-          </a:xfrm>
-          <a:prstGeom prst="rect">
-            <a:avLst/>
-          </a:prstGeom>
-          <a:noFill/>
-        </p:spPr>
-        <p:txBody>
-          <a:bodyPr wrap="none" rtlCol="1">
-            <a:spAutoFit/>
-          </a:bodyPr>
-          <a:lstStyle/>
-          <a:p>
-            <a:r>
-              <a:rPr lang="en-US" dirty="0"/>
-              <a:t>You can also apply concept restrictions to auto variables:</a:t>
-            </a:r>
-            <a:endParaRPr lang="he-IL" dirty="0"/>
-          </a:p>
-        </p:txBody>
-      </p:sp>
-      <p:pic>
-        <p:nvPicPr>
-          <p:cNvPr id="11" name="Picture 10"/>
-          <p:cNvPicPr>
-            <a:picLocks noChangeAspect="1"/>
-          </p:cNvPicPr>
-          <p:nvPr/>
-        </p:nvPicPr>
-        <p:blipFill>
-          <a:blip r:embed="rId2"/>
-          <a:stretch>
-            <a:fillRect/>
-          </a:stretch>
-        </p:blipFill>
-        <p:spPr>
-          <a:xfrm>
-            <a:off x="1234927" y="5377041"/>
-            <a:ext cx="2076450" cy="447675"/>
-          </a:xfrm>
-          <a:prstGeom prst="rect">
-            <a:avLst/>
-          </a:prstGeom>
-        </p:spPr>
-      </p:pic>
-      <p:pic>
-        <p:nvPicPr>
-          <p:cNvPr id="13" name="Picture 12"/>
-          <p:cNvPicPr>
-            <a:picLocks noChangeAspect="1"/>
-          </p:cNvPicPr>
-          <p:nvPr/>
-        </p:nvPicPr>
-        <p:blipFill>
-          <a:blip r:embed="rId3"/>
-          <a:stretch>
-            <a:fillRect/>
-          </a:stretch>
-        </p:blipFill>
-        <p:spPr>
-          <a:xfrm>
-            <a:off x="1234927" y="2428232"/>
-            <a:ext cx="7267575" cy="2590800"/>
-          </a:xfrm>
-          <a:prstGeom prst="rect">
-            <a:avLst/>
-          </a:prstGeom>
-        </p:spPr>
-      </p:pic>
-    </p:spTree>
-    <p:extLst>
-      <p:ext uri="{BB962C8B-B14F-4D97-AF65-F5344CB8AC3E}">
-        <p14:creationId xmlns:p14="http://schemas.microsoft.com/office/powerpoint/2010/main" val="2463616285"/>
-      </p:ext>
-    </p:extLst>
-  </p:cSld>
-  <p:clrMapOvr>
-    <a:masterClrMapping/>
-  </p:clrMapOvr>
-  <p:timing>
-    <p:tnLst>
-      <p:par>
-        <p:cTn id="1" dur="indefinite" restart="never" nodeType="tmRoot">
-          <p:childTnLst>
-            <p:seq concurrent="1" nextAc="seek">
-              <p:cTn id="2" dur="indefinite" nodeType="mainSeq">
-                <p:childTnLst>
-                  <p:par>
-                    <p:cTn id="3" fill="hold">
-                      <p:stCondLst>
-                        <p:cond delay="indefinite"/>
-                      </p:stCondLst>
-                      <p:childTnLst>
-                        <p:par>
-                          <p:cTn id="4" fill="hold">
-                            <p:stCondLst>
-                              <p:cond delay="0"/>
-                            </p:stCondLst>
-                            <p:childTnLst>
-                              <p:par>
-                                <p:cTn id="5" presetID="42" presetClass="entr" presetSubtype="0" fill="hold" grpId="0" nodeType="clickEffect">
-                                  <p:stCondLst>
-                                    <p:cond delay="0"/>
-                                  </p:stCondLst>
-                                  <p:childTnLst>
-                                    <p:set>
-                                      <p:cBhvr>
-                                        <p:cTn id="6" dur="1" fill="hold">
-                                          <p:stCondLst>
-                                            <p:cond delay="0"/>
-                                          </p:stCondLst>
-                                        </p:cTn>
-                                        <p:tgtEl>
-                                          <p:spTgt spid="4"/>
-                                        </p:tgtEl>
-                                        <p:attrNameLst>
-                                          <p:attrName>style.visibility</p:attrName>
-                                        </p:attrNameLst>
-                                      </p:cBhvr>
-                                      <p:to>
-                                        <p:strVal val="visible"/>
-                                      </p:to>
-                                    </p:set>
-                                    <p:animEffect transition="in" filter="fade">
-                                      <p:cBhvr>
-                                        <p:cTn id="7" dur="1000"/>
-                                        <p:tgtEl>
-                                          <p:spTgt spid="4"/>
-                                        </p:tgtEl>
-                                      </p:cBhvr>
-                                    </p:animEffect>
-                                    <p:anim calcmode="lin" valueType="num">
-                                      <p:cBhvr>
-                                        <p:cTn id="8" dur="1000" fill="hold"/>
-                                        <p:tgtEl>
-                                          <p:spTgt spid="4"/>
-                                        </p:tgtEl>
-                                        <p:attrNameLst>
-                                          <p:attrName>ppt_x</p:attrName>
-                                        </p:attrNameLst>
-                                      </p:cBhvr>
-                                      <p:tavLst>
-                                        <p:tav tm="0">
-                                          <p:val>
-                                            <p:strVal val="#ppt_x"/>
-                                          </p:val>
-                                        </p:tav>
-                                        <p:tav tm="100000">
-                                          <p:val>
-                                            <p:strVal val="#ppt_x"/>
-                                          </p:val>
-                                        </p:tav>
-                                      </p:tavLst>
-                                    </p:anim>
-                                    <p:anim calcmode="lin" valueType="num">
-                                      <p:cBhvr>
-                                        <p:cTn id="9" dur="1000" fill="hold"/>
-                                        <p:tgtEl>
-                                          <p:spTgt spid="4"/>
-                                        </p:tgtEl>
-                                        <p:attrNameLst>
-                                          <p:attrName>ppt_y</p:attrName>
-                                        </p:attrNameLst>
-                                      </p:cBhvr>
-                                      <p:tavLst>
-                                        <p:tav tm="0">
-                                          <p:val>
-                                            <p:strVal val="#ppt_y+.1"/>
-                                          </p:val>
-                                        </p:tav>
-                                        <p:tav tm="100000">
-                                          <p:val>
-                                            <p:strVal val="#ppt_y"/>
-                                          </p:val>
-                                        </p:tav>
-                                      </p:tavLst>
-                                    </p:anim>
-                                  </p:childTnLst>
-                                </p:cTn>
-                              </p:par>
-                            </p:childTnLst>
-                          </p:cTn>
-                        </p:par>
-                      </p:childTnLst>
-                    </p:cTn>
-                  </p:par>
-                  <p:par>
-                    <p:cTn id="10" fill="hold">
-                      <p:stCondLst>
-                        <p:cond delay="indefinite"/>
-                      </p:stCondLst>
-                      <p:childTnLst>
-                        <p:par>
-                          <p:cTn id="11" fill="hold">
-                            <p:stCondLst>
-                              <p:cond delay="0"/>
-                            </p:stCondLst>
-                            <p:childTnLst>
-                              <p:par>
-                                <p:cTn id="12" presetID="22" presetClass="entr" presetSubtype="8" fill="hold" grpId="0" nodeType="clickEffect">
-                                  <p:stCondLst>
-                                    <p:cond delay="0"/>
-                                  </p:stCondLst>
-                                  <p:iterate type="lt">
-                                    <p:tmPct val="10000"/>
-                                  </p:iterate>
-                                  <p:childTnLst>
-                                    <p:set>
-                                      <p:cBhvr>
-                                        <p:cTn id="13" dur="1" fill="hold">
-                                          <p:stCondLst>
-                                            <p:cond delay="0"/>
-                                          </p:stCondLst>
-                                        </p:cTn>
-                                        <p:tgtEl>
-                                          <p:spTgt spid="5"/>
-                                        </p:tgtEl>
-                                        <p:attrNameLst>
-                                          <p:attrName>style.visibility</p:attrName>
-                                        </p:attrNameLst>
-                                      </p:cBhvr>
-                                      <p:to>
-                                        <p:strVal val="visible"/>
-                                      </p:to>
-                                    </p:set>
-                                    <p:animEffect transition="in" filter="wipe(left)">
-                                      <p:cBhvr>
-                                        <p:cTn id="14" dur="100"/>
-                                        <p:tgtEl>
-                                          <p:spTgt spid="5"/>
-                                        </p:tgtEl>
-                                      </p:cBhvr>
-                                    </p:animEffect>
-                                  </p:childTnLst>
-                                </p:cTn>
-                              </p:par>
-                            </p:childTnLst>
-                          </p:cTn>
-                        </p:par>
-                        <p:par>
-                          <p:cTn id="15" fill="hold">
-                            <p:stCondLst>
-                              <p:cond delay="1880"/>
-                            </p:stCondLst>
-                            <p:childTnLst>
-                              <p:par>
-                                <p:cTn id="16" presetID="14" presetClass="entr" presetSubtype="5" fill="hold" nodeType="afterEffect">
-                                  <p:stCondLst>
-                                    <p:cond delay="0"/>
-                                  </p:stCondLst>
-                                  <p:childTnLst>
-                                    <p:set>
-                                      <p:cBhvr>
-                                        <p:cTn id="17" dur="1" fill="hold">
-                                          <p:stCondLst>
-                                            <p:cond delay="0"/>
-                                          </p:stCondLst>
-                                        </p:cTn>
-                                        <p:tgtEl>
-                                          <p:spTgt spid="13"/>
-                                        </p:tgtEl>
-                                        <p:attrNameLst>
-                                          <p:attrName>style.visibility</p:attrName>
-                                        </p:attrNameLst>
-                                      </p:cBhvr>
-                                      <p:to>
-                                        <p:strVal val="visible"/>
-                                      </p:to>
-                                    </p:set>
-                                    <p:animEffect transition="in" filter="randombar(vertical)">
-                                      <p:cBhvr>
-                                        <p:cTn id="18" dur="500"/>
-                                        <p:tgtEl>
-                                          <p:spTgt spid="13"/>
-                                        </p:tgtEl>
-                                      </p:cBhvr>
-                                    </p:animEffect>
-                                  </p:childTnLst>
-                                </p:cTn>
-                              </p:par>
-                            </p:childTnLst>
-                          </p:cTn>
-                        </p:par>
-                      </p:childTnLst>
-                    </p:cTn>
-                  </p:par>
-                  <p:par>
-                    <p:cTn id="19" fill="hold">
-                      <p:stCondLst>
-                        <p:cond delay="indefinite"/>
-                      </p:stCondLst>
-                      <p:childTnLst>
-                        <p:par>
-                          <p:cTn id="20" fill="hold">
-                            <p:stCondLst>
-                              <p:cond delay="0"/>
-                            </p:stCondLst>
-                            <p:childTnLst>
-                              <p:par>
-                                <p:cTn id="21" presetID="22" presetClass="entr" presetSubtype="8" fill="hold" grpId="0" nodeType="clickEffect">
-                                  <p:stCondLst>
-                                    <p:cond delay="0"/>
-                                  </p:stCondLst>
-                                  <p:childTnLst>
-                                    <p:set>
-                                      <p:cBhvr>
-                                        <p:cTn id="22" dur="1" fill="hold">
-                                          <p:stCondLst>
-                                            <p:cond delay="0"/>
-                                          </p:stCondLst>
-                                        </p:cTn>
-                                        <p:tgtEl>
-                                          <p:spTgt spid="9"/>
-                                        </p:tgtEl>
-                                        <p:attrNameLst>
-                                          <p:attrName>style.visibility</p:attrName>
-                                        </p:attrNameLst>
-                                      </p:cBhvr>
-                                      <p:to>
-                                        <p:strVal val="visible"/>
-                                      </p:to>
-                                    </p:set>
-                                    <p:animEffect transition="in" filter="wipe(left)">
-                                      <p:cBhvr>
-                                        <p:cTn id="23" dur="500"/>
-                                        <p:tgtEl>
-                                          <p:spTgt spid="9"/>
-                                        </p:tgtEl>
-                                      </p:cBhvr>
-                                    </p:animEffect>
-                                  </p:childTnLst>
-                                </p:cTn>
-                              </p:par>
-                            </p:childTnLst>
-                          </p:cTn>
-                        </p:par>
-                        <p:par>
-                          <p:cTn id="24" fill="hold">
-                            <p:stCondLst>
-                              <p:cond delay="500"/>
-                            </p:stCondLst>
-                            <p:childTnLst>
-                              <p:par>
-                                <p:cTn id="25" presetID="21" presetClass="entr" presetSubtype="1" fill="hold" nodeType="afterEffect">
-                                  <p:stCondLst>
-                                    <p:cond delay="0"/>
-                                  </p:stCondLst>
-                                  <p:childTnLst>
-                                    <p:set>
-                                      <p:cBhvr>
-                                        <p:cTn id="26" dur="1" fill="hold">
-                                          <p:stCondLst>
-                                            <p:cond delay="0"/>
-                                          </p:stCondLst>
-                                        </p:cTn>
-                                        <p:tgtEl>
-                                          <p:spTgt spid="11"/>
-                                        </p:tgtEl>
-                                        <p:attrNameLst>
-                                          <p:attrName>style.visibility</p:attrName>
-                                        </p:attrNameLst>
-                                      </p:cBhvr>
-                                      <p:to>
-                                        <p:strVal val="visible"/>
-                                      </p:to>
-                                    </p:set>
-                                    <p:animEffect transition="in" filter="wheel(1)">
-                                      <p:cBhvr>
-                                        <p:cTn id="27" dur="2000"/>
-                                        <p:tgtEl>
-                                          <p:spTgt spid="11"/>
-                                        </p:tgtEl>
-                                      </p:cBhvr>
-                                    </p:animEffect>
-                                  </p:childTnLst>
-                                </p:cTn>
-                              </p:par>
-                            </p:childTnLst>
-                          </p:cTn>
-                        </p:par>
-                      </p:childTnLst>
-                    </p:cTn>
-                  </p:par>
-                </p:childTnLst>
-              </p:cTn>
-              <p:prevCondLst>
-                <p:cond evt="onPrev" delay="0">
-                  <p:tgtEl>
-                    <p:sldTgt/>
-                  </p:tgtEl>
-                </p:cond>
-              </p:prevCondLst>
-              <p:nextCondLst>
-                <p:cond evt="onNext" delay="0">
-                  <p:tgtEl>
-                    <p:sldTgt/>
-                  </p:tgtEl>
-                </p:cond>
-              </p:nextCondLst>
-            </p:seq>
-          </p:childTnLst>
-        </p:cTn>
-      </p:par>
-    </p:tnLst>
-    <p:bldLst>
-      <p:bldP spid="4" grpId="0"/>
-      <p:bldP spid="5" grpId="0"/>
-      <p:bldP spid="9" grpId="0"/>
     </p:bldLst>
   </p:timing>
 </p:sld>

</xml_diff>